<commit_message>
pocking linear invocation between nodes
</commit_message>
<xml_diff>
--- a/schema.pptx
+++ b/schema.pptx
@@ -8,6 +8,7 @@
     <p:sldId id="256" r:id="rId2"/>
     <p:sldId id="258" r:id="rId3"/>
     <p:sldId id="257" r:id="rId4"/>
+    <p:sldId id="259" r:id="rId5"/>
   </p:sldIdLst>
   <p:sldSz cx="9144000" cy="6858000" type="screen4x3"/>
   <p:notesSz cx="6858000" cy="9144000"/>
@@ -290,7 +291,7 @@
           <a:p>
             <a:fld id="{AA309A6D-C09C-4548-B29A-6CF363A7E532}" type="datetimeFigureOut">
               <a:rPr lang="fr-FR" smtClean="0"/>
-              <a:t>26/07/2015</a:t>
+              <a:t>28/07/2015</a:t>
             </a:fld>
             <a:endParaRPr lang="fr-BE"/>
           </a:p>
@@ -455,7 +456,7 @@
           <a:p>
             <a:fld id="{AA309A6D-C09C-4548-B29A-6CF363A7E532}" type="datetimeFigureOut">
               <a:rPr lang="fr-FR" smtClean="0"/>
-              <a:t>26/07/2015</a:t>
+              <a:t>28/07/2015</a:t>
             </a:fld>
             <a:endParaRPr lang="fr-BE"/>
           </a:p>
@@ -630,7 +631,7 @@
           <a:p>
             <a:fld id="{AA309A6D-C09C-4548-B29A-6CF363A7E532}" type="datetimeFigureOut">
               <a:rPr lang="fr-FR" smtClean="0"/>
-              <a:t>26/07/2015</a:t>
+              <a:t>28/07/2015</a:t>
             </a:fld>
             <a:endParaRPr lang="fr-BE"/>
           </a:p>
@@ -795,7 +796,7 @@
           <a:p>
             <a:fld id="{AA309A6D-C09C-4548-B29A-6CF363A7E532}" type="datetimeFigureOut">
               <a:rPr lang="fr-FR" smtClean="0"/>
-              <a:t>26/07/2015</a:t>
+              <a:t>28/07/2015</a:t>
             </a:fld>
             <a:endParaRPr lang="fr-BE"/>
           </a:p>
@@ -1036,7 +1037,7 @@
           <a:p>
             <a:fld id="{AA309A6D-C09C-4548-B29A-6CF363A7E532}" type="datetimeFigureOut">
               <a:rPr lang="fr-FR" smtClean="0"/>
-              <a:t>26/07/2015</a:t>
+              <a:t>28/07/2015</a:t>
             </a:fld>
             <a:endParaRPr lang="fr-BE"/>
           </a:p>
@@ -1319,7 +1320,7 @@
           <a:p>
             <a:fld id="{AA309A6D-C09C-4548-B29A-6CF363A7E532}" type="datetimeFigureOut">
               <a:rPr lang="fr-FR" smtClean="0"/>
-              <a:t>26/07/2015</a:t>
+              <a:t>28/07/2015</a:t>
             </a:fld>
             <a:endParaRPr lang="fr-BE"/>
           </a:p>
@@ -1736,7 +1737,7 @@
           <a:p>
             <a:fld id="{AA309A6D-C09C-4548-B29A-6CF363A7E532}" type="datetimeFigureOut">
               <a:rPr lang="fr-FR" smtClean="0"/>
-              <a:t>26/07/2015</a:t>
+              <a:t>28/07/2015</a:t>
             </a:fld>
             <a:endParaRPr lang="fr-BE"/>
           </a:p>
@@ -1849,7 +1850,7 @@
           <a:p>
             <a:fld id="{AA309A6D-C09C-4548-B29A-6CF363A7E532}" type="datetimeFigureOut">
               <a:rPr lang="fr-FR" smtClean="0"/>
-              <a:t>26/07/2015</a:t>
+              <a:t>28/07/2015</a:t>
             </a:fld>
             <a:endParaRPr lang="fr-BE"/>
           </a:p>
@@ -1939,7 +1940,7 @@
           <a:p>
             <a:fld id="{AA309A6D-C09C-4548-B29A-6CF363A7E532}" type="datetimeFigureOut">
               <a:rPr lang="fr-FR" smtClean="0"/>
-              <a:t>26/07/2015</a:t>
+              <a:t>28/07/2015</a:t>
             </a:fld>
             <a:endParaRPr lang="fr-BE"/>
           </a:p>
@@ -2211,7 +2212,7 @@
           <a:p>
             <a:fld id="{AA309A6D-C09C-4548-B29A-6CF363A7E532}" type="datetimeFigureOut">
               <a:rPr lang="fr-FR" smtClean="0"/>
-              <a:t>26/07/2015</a:t>
+              <a:t>28/07/2015</a:t>
             </a:fld>
             <a:endParaRPr lang="fr-BE"/>
           </a:p>
@@ -2459,7 +2460,7 @@
           <a:p>
             <a:fld id="{AA309A6D-C09C-4548-B29A-6CF363A7E532}" type="datetimeFigureOut">
               <a:rPr lang="fr-FR" smtClean="0"/>
-              <a:t>26/07/2015</a:t>
+              <a:t>28/07/2015</a:t>
             </a:fld>
             <a:endParaRPr lang="fr-BE"/>
           </a:p>
@@ -2667,7 +2668,7 @@
           <a:p>
             <a:fld id="{AA309A6D-C09C-4548-B29A-6CF363A7E532}" type="datetimeFigureOut">
               <a:rPr lang="fr-FR" smtClean="0"/>
-              <a:t>26/07/2015</a:t>
+              <a:t>28/07/2015</a:t>
             </a:fld>
             <a:endParaRPr lang="fr-BE"/>
           </a:p>
@@ -3045,7 +3046,7 @@
         </p:nvGrpSpPr>
         <p:grpSpPr>
           <a:xfrm>
-            <a:off x="556145" y="4467902"/>
+            <a:off x="1310888" y="4179812"/>
             <a:ext cx="1948930" cy="775033"/>
             <a:chOff x="1084416" y="1814735"/>
             <a:chExt cx="1948930" cy="1893665"/>
@@ -3163,8 +3164,8 @@
         </p:nvCxnSpPr>
         <p:spPr>
           <a:xfrm rot="5400000" flipH="1" flipV="1">
-            <a:off x="960821" y="3251827"/>
-            <a:ext cx="1785865" cy="646287"/>
+            <a:off x="2630792" y="2142155"/>
+            <a:ext cx="1692219" cy="2383097"/>
           </a:xfrm>
           <a:prstGeom prst="bentConnector3">
             <a:avLst>
@@ -3198,7 +3199,7 @@
         </p:nvGrpSpPr>
         <p:grpSpPr>
           <a:xfrm>
-            <a:off x="2889554" y="4493192"/>
+            <a:off x="6082697" y="4156386"/>
             <a:ext cx="1948930" cy="775033"/>
             <a:chOff x="1084416" y="1814735"/>
             <a:chExt cx="1948930" cy="1893665"/>
@@ -3310,14 +3311,14 @@
           <p:cNvPr id="22" name="Connecteur en angle 21"/>
           <p:cNvCxnSpPr>
             <a:stCxn id="21" idx="0"/>
-            <a:endCxn id="30" idx="2"/>
+            <a:endCxn id="33" idx="2"/>
           </p:cNvCxnSpPr>
           <p:nvPr/>
         </p:nvCxnSpPr>
         <p:spPr>
           <a:xfrm rot="16200000" flipV="1">
-            <a:off x="2283523" y="2826237"/>
-            <a:ext cx="1811577" cy="1523178"/>
+            <a:off x="5620915" y="2633679"/>
+            <a:ext cx="1669215" cy="1377043"/>
           </a:xfrm>
           <a:prstGeom prst="bentConnector3">
             <a:avLst>
@@ -3345,301 +3346,61 @@
       </p:cxnSp>
       <p:grpSp>
         <p:nvGrpSpPr>
-          <p:cNvPr id="36" name="Groupe 35"/>
+          <p:cNvPr id="3" name="Groupe 2"/>
           <p:cNvGrpSpPr/>
           <p:nvPr/>
         </p:nvGrpSpPr>
         <p:grpSpPr>
           <a:xfrm>
-            <a:off x="1726337" y="1188543"/>
-            <a:ext cx="1948930" cy="1536700"/>
-            <a:chOff x="688962" y="583534"/>
-            <a:chExt cx="1948930" cy="2032666"/>
+            <a:off x="4217890" y="994098"/>
+            <a:ext cx="1948930" cy="1647502"/>
+            <a:chOff x="1726337" y="1188542"/>
+            <a:chExt cx="1948930" cy="1647502"/>
           </a:xfrm>
         </p:grpSpPr>
-        <p:sp>
-          <p:nvSpPr>
-            <p:cNvPr id="30" name="Rectangle à coins arrondis 29"/>
-            <p:cNvSpPr/>
-            <p:nvPr/>
-          </p:nvSpPr>
-          <p:spPr>
-            <a:xfrm>
-              <a:off x="1317018" y="2463800"/>
-              <a:ext cx="146657" cy="95250"/>
-            </a:xfrm>
-            <a:prstGeom prst="roundRect">
-              <a:avLst/>
-            </a:prstGeom>
-          </p:spPr>
-          <p:style>
-            <a:lnRef idx="2">
-              <a:schemeClr val="accent1">
-                <a:shade val="50000"/>
-              </a:schemeClr>
-            </a:lnRef>
-            <a:fillRef idx="1">
-              <a:schemeClr val="accent1"/>
-            </a:fillRef>
-            <a:effectRef idx="0">
-              <a:schemeClr val="accent1"/>
-            </a:effectRef>
-            <a:fontRef idx="minor">
-              <a:schemeClr val="lt1"/>
-            </a:fontRef>
-          </p:style>
-          <p:txBody>
-            <a:bodyPr rtlCol="0" anchor="ctr"/>
-            <a:lstStyle/>
-            <a:p>
-              <a:pPr algn="ctr"/>
-              <a:endParaRPr lang="fr-FR"/>
-            </a:p>
-          </p:txBody>
-        </p:sp>
-        <p:sp>
-          <p:nvSpPr>
-            <p:cNvPr id="31" name="Rectangle à coins arrondis 30"/>
-            <p:cNvSpPr/>
-            <p:nvPr/>
-          </p:nvSpPr>
-          <p:spPr>
-            <a:xfrm>
-              <a:off x="1566434" y="2463800"/>
-              <a:ext cx="146657" cy="95250"/>
-            </a:xfrm>
-            <a:prstGeom prst="roundRect">
-              <a:avLst/>
-            </a:prstGeom>
-          </p:spPr>
-          <p:style>
-            <a:lnRef idx="2">
-              <a:schemeClr val="accent1">
-                <a:shade val="50000"/>
-              </a:schemeClr>
-            </a:lnRef>
-            <a:fillRef idx="1">
-              <a:schemeClr val="accent1"/>
-            </a:fillRef>
-            <a:effectRef idx="0">
-              <a:schemeClr val="accent1"/>
-            </a:effectRef>
-            <a:fontRef idx="minor">
-              <a:schemeClr val="lt1"/>
-            </a:fontRef>
-          </p:style>
-          <p:txBody>
-            <a:bodyPr rtlCol="0" anchor="ctr"/>
-            <a:lstStyle/>
-            <a:p>
-              <a:pPr algn="ctr"/>
-              <a:endParaRPr lang="fr-FR"/>
-            </a:p>
-          </p:txBody>
-        </p:sp>
-        <p:sp>
-          <p:nvSpPr>
-            <p:cNvPr id="32" name="Rectangle à coins arrondis 31"/>
-            <p:cNvSpPr/>
-            <p:nvPr/>
-          </p:nvSpPr>
-          <p:spPr>
-            <a:xfrm>
-              <a:off x="1825072" y="2463800"/>
-              <a:ext cx="146657" cy="95250"/>
-            </a:xfrm>
-            <a:prstGeom prst="roundRect">
-              <a:avLst/>
-            </a:prstGeom>
-          </p:spPr>
-          <p:style>
-            <a:lnRef idx="2">
-              <a:schemeClr val="accent1">
-                <a:shade val="50000"/>
-              </a:schemeClr>
-            </a:lnRef>
-            <a:fillRef idx="1">
-              <a:schemeClr val="accent1"/>
-            </a:fillRef>
-            <a:effectRef idx="0">
-              <a:schemeClr val="accent1"/>
-            </a:effectRef>
-            <a:fontRef idx="minor">
-              <a:schemeClr val="lt1"/>
-            </a:fontRef>
-          </p:style>
-          <p:txBody>
-            <a:bodyPr rtlCol="0" anchor="ctr"/>
-            <a:lstStyle/>
-            <a:p>
-              <a:pPr algn="ctr"/>
-              <a:endParaRPr lang="fr-FR"/>
-            </a:p>
-          </p:txBody>
-        </p:sp>
-        <p:sp>
-          <p:nvSpPr>
-            <p:cNvPr id="33" name="Rectangle à coins arrondis 32"/>
-            <p:cNvSpPr/>
-            <p:nvPr/>
-          </p:nvSpPr>
-          <p:spPr>
-            <a:xfrm>
-              <a:off x="2094893" y="2463800"/>
-              <a:ext cx="146657" cy="95250"/>
-            </a:xfrm>
-            <a:prstGeom prst="roundRect">
-              <a:avLst/>
-            </a:prstGeom>
-          </p:spPr>
-          <p:style>
-            <a:lnRef idx="2">
-              <a:schemeClr val="accent1">
-                <a:shade val="50000"/>
-              </a:schemeClr>
-            </a:lnRef>
-            <a:fillRef idx="1">
-              <a:schemeClr val="accent1"/>
-            </a:fillRef>
-            <a:effectRef idx="0">
-              <a:schemeClr val="accent1"/>
-            </a:effectRef>
-            <a:fontRef idx="minor">
-              <a:schemeClr val="lt1"/>
-            </a:fontRef>
-          </p:style>
-          <p:txBody>
-            <a:bodyPr rtlCol="0" anchor="ctr"/>
-            <a:lstStyle/>
-            <a:p>
-              <a:pPr algn="ctr"/>
-              <a:endParaRPr lang="fr-FR"/>
-            </a:p>
-          </p:txBody>
-        </p:sp>
-        <p:sp>
-          <p:nvSpPr>
-            <p:cNvPr id="34" name="Rectangle à coins arrondis 33"/>
-            <p:cNvSpPr/>
-            <p:nvPr/>
-          </p:nvSpPr>
-          <p:spPr>
-            <a:xfrm>
-              <a:off x="1066193" y="2463800"/>
-              <a:ext cx="146657" cy="95250"/>
-            </a:xfrm>
-            <a:prstGeom prst="roundRect">
-              <a:avLst/>
-            </a:prstGeom>
-          </p:spPr>
-          <p:style>
-            <a:lnRef idx="2">
-              <a:schemeClr val="accent1">
-                <a:shade val="50000"/>
-              </a:schemeClr>
-            </a:lnRef>
-            <a:fillRef idx="1">
-              <a:schemeClr val="accent1"/>
-            </a:fillRef>
-            <a:effectRef idx="0">
-              <a:schemeClr val="accent1"/>
-            </a:effectRef>
-            <a:fontRef idx="minor">
-              <a:schemeClr val="lt1"/>
-            </a:fontRef>
-          </p:style>
-          <p:txBody>
-            <a:bodyPr rtlCol="0" anchor="ctr"/>
-            <a:lstStyle/>
-            <a:p>
-              <a:pPr algn="ctr"/>
-              <a:endParaRPr lang="fr-FR"/>
-            </a:p>
-          </p:txBody>
-        </p:sp>
-        <p:sp>
-          <p:nvSpPr>
-            <p:cNvPr id="35" name="Rectangle à coins arrondis 34"/>
-            <p:cNvSpPr/>
-            <p:nvPr/>
-          </p:nvSpPr>
-          <p:spPr>
-            <a:xfrm>
-              <a:off x="2358418" y="2463800"/>
-              <a:ext cx="146657" cy="95250"/>
-            </a:xfrm>
-            <a:prstGeom prst="roundRect">
-              <a:avLst/>
-            </a:prstGeom>
-          </p:spPr>
-          <p:style>
-            <a:lnRef idx="2">
-              <a:schemeClr val="accent1">
-                <a:shade val="50000"/>
-              </a:schemeClr>
-            </a:lnRef>
-            <a:fillRef idx="1">
-              <a:schemeClr val="accent1"/>
-            </a:fillRef>
-            <a:effectRef idx="0">
-              <a:schemeClr val="accent1"/>
-            </a:effectRef>
-            <a:fontRef idx="minor">
-              <a:schemeClr val="lt1"/>
-            </a:fontRef>
-          </p:style>
-          <p:txBody>
-            <a:bodyPr rtlCol="0" anchor="ctr"/>
-            <a:lstStyle/>
-            <a:p>
-              <a:pPr algn="ctr"/>
-              <a:endParaRPr lang="fr-FR"/>
-            </a:p>
-          </p:txBody>
-        </p:sp>
         <p:grpSp>
           <p:nvGrpSpPr>
-            <p:cNvPr id="9" name="Groupe 8"/>
+            <p:cNvPr id="36" name="Groupe 35"/>
             <p:cNvGrpSpPr/>
             <p:nvPr/>
           </p:nvGrpSpPr>
           <p:grpSpPr>
             <a:xfrm>
-              <a:off x="688962" y="583534"/>
-              <a:ext cx="1948930" cy="2032666"/>
-              <a:chOff x="1084416" y="1814734"/>
-              <a:chExt cx="1948930" cy="2260949"/>
+              <a:off x="1726337" y="1188542"/>
+              <a:ext cx="1948930" cy="1647502"/>
+              <a:chOff x="688962" y="583533"/>
+              <a:chExt cx="1948930" cy="2179229"/>
             </a:xfrm>
           </p:grpSpPr>
           <p:sp>
             <p:nvSpPr>
-              <p:cNvPr id="5" name="Rectangle à coins arrondis 4"/>
+              <p:cNvPr id="30" name="Rectangle à coins arrondis 29"/>
               <p:cNvSpPr/>
               <p:nvPr/>
             </p:nvSpPr>
             <p:spPr>
               <a:xfrm>
-                <a:off x="1084416" y="1814734"/>
-                <a:ext cx="1948930" cy="2260949"/>
+                <a:off x="1317018" y="2463800"/>
+                <a:ext cx="146657" cy="95250"/>
               </a:xfrm>
               <a:prstGeom prst="roundRect">
-                <a:avLst>
-                  <a:gd name="adj" fmla="val 1827"/>
-                </a:avLst>
+                <a:avLst/>
               </a:prstGeom>
             </p:spPr>
             <p:style>
-              <a:lnRef idx="1">
-                <a:schemeClr val="accent3"/>
+              <a:lnRef idx="2">
+                <a:schemeClr val="accent1">
+                  <a:shade val="50000"/>
+                </a:schemeClr>
               </a:lnRef>
-              <a:fillRef idx="2">
-                <a:schemeClr val="accent3"/>
+              <a:fillRef idx="1">
+                <a:schemeClr val="accent1"/>
               </a:fillRef>
-              <a:effectRef idx="1">
-                <a:schemeClr val="accent3"/>
+              <a:effectRef idx="0">
+                <a:schemeClr val="accent1"/>
               </a:effectRef>
               <a:fontRef idx="minor">
-                <a:schemeClr val="dk1"/>
+                <a:schemeClr val="lt1"/>
               </a:fontRef>
             </p:style>
             <p:txBody>
@@ -3647,126 +3408,341 @@
               <a:lstStyle/>
               <a:p>
                 <a:pPr algn="ctr"/>
-                <a:endParaRPr lang="fr-FR" dirty="0"/>
+                <a:endParaRPr lang="fr-FR"/>
               </a:p>
             </p:txBody>
           </p:sp>
-          <p:cxnSp>
-            <p:nvCxnSpPr>
-              <p:cNvPr id="7" name="Connecteur droit 6"/>
-              <p:cNvCxnSpPr/>
+          <p:sp>
+            <p:nvSpPr>
+              <p:cNvPr id="31" name="Rectangle à coins arrondis 30"/>
+              <p:cNvSpPr/>
               <p:nvPr/>
-            </p:nvCxnSpPr>
+            </p:nvSpPr>
             <p:spPr>
               <a:xfrm>
-                <a:off x="1084416" y="2321184"/>
-                <a:ext cx="1948930" cy="0"/>
+                <a:off x="1585484" y="2463800"/>
+                <a:ext cx="146657" cy="95250"/>
               </a:xfrm>
-              <a:prstGeom prst="line">
+              <a:prstGeom prst="roundRect">
                 <a:avLst/>
               </a:prstGeom>
             </p:spPr>
             <p:style>
-              <a:lnRef idx="1">
-                <a:schemeClr val="accent3"/>
+              <a:lnRef idx="2">
+                <a:schemeClr val="accent1">
+                  <a:shade val="50000"/>
+                </a:schemeClr>
               </a:lnRef>
-              <a:fillRef idx="0">
-                <a:schemeClr val="accent3"/>
+              <a:fillRef idx="1">
+                <a:schemeClr val="accent1"/>
               </a:fillRef>
               <a:effectRef idx="0">
-                <a:schemeClr val="accent3"/>
+                <a:schemeClr val="accent1"/>
               </a:effectRef>
               <a:fontRef idx="minor">
-                <a:schemeClr val="tx1"/>
+                <a:schemeClr val="lt1"/>
               </a:fontRef>
             </p:style>
-          </p:cxnSp>
+            <p:txBody>
+              <a:bodyPr rtlCol="0" anchor="ctr"/>
+              <a:lstStyle/>
+              <a:p>
+                <a:pPr algn="ctr"/>
+                <a:endParaRPr lang="fr-FR"/>
+              </a:p>
+            </p:txBody>
+          </p:sp>
           <p:sp>
             <p:nvSpPr>
-              <p:cNvPr id="8" name="ZoneTexte 7"/>
-              <p:cNvSpPr txBox="1"/>
+              <p:cNvPr id="32" name="Rectangle à coins arrondis 31"/>
+              <p:cNvSpPr/>
               <p:nvPr/>
             </p:nvSpPr>
             <p:spPr>
               <a:xfrm>
-                <a:off x="1712472" y="1815767"/>
-                <a:ext cx="692818" cy="369332"/>
+                <a:off x="1882222" y="2463800"/>
+                <a:ext cx="146657" cy="95250"/>
               </a:xfrm>
-              <a:prstGeom prst="rect">
+              <a:prstGeom prst="roundRect">
                 <a:avLst/>
               </a:prstGeom>
-              <a:noFill/>
             </p:spPr>
+            <p:style>
+              <a:lnRef idx="2">
+                <a:schemeClr val="accent1">
+                  <a:shade val="50000"/>
+                </a:schemeClr>
+              </a:lnRef>
+              <a:fillRef idx="1">
+                <a:schemeClr val="accent1"/>
+              </a:fillRef>
+              <a:effectRef idx="0">
+                <a:schemeClr val="accent1"/>
+              </a:effectRef>
+              <a:fontRef idx="minor">
+                <a:schemeClr val="lt1"/>
+              </a:fontRef>
+            </p:style>
             <p:txBody>
-              <a:bodyPr wrap="none" rtlCol="0">
-                <a:spAutoFit/>
-              </a:bodyPr>
+              <a:bodyPr rtlCol="0" anchor="ctr"/>
               <a:lstStyle/>
               <a:p>
-                <a:r>
-                  <a:rPr lang="fr-FR" dirty="0" err="1" smtClean="0"/>
-                  <a:t>Node</a:t>
-                </a:r>
-                <a:endParaRPr lang="fr-FR" dirty="0"/>
+                <a:pPr algn="ctr"/>
+                <a:endParaRPr lang="fr-FR"/>
               </a:p>
             </p:txBody>
           </p:sp>
+          <p:sp>
+            <p:nvSpPr>
+              <p:cNvPr id="33" name="Rectangle à coins arrondis 32"/>
+              <p:cNvSpPr/>
+              <p:nvPr/>
+            </p:nvSpPr>
+            <p:spPr>
+              <a:xfrm>
+                <a:off x="2164743" y="2463800"/>
+                <a:ext cx="146657" cy="95250"/>
+              </a:xfrm>
+              <a:prstGeom prst="roundRect">
+                <a:avLst/>
+              </a:prstGeom>
+            </p:spPr>
+            <p:style>
+              <a:lnRef idx="2">
+                <a:schemeClr val="accent1">
+                  <a:shade val="50000"/>
+                </a:schemeClr>
+              </a:lnRef>
+              <a:fillRef idx="1">
+                <a:schemeClr val="accent1"/>
+              </a:fillRef>
+              <a:effectRef idx="0">
+                <a:schemeClr val="accent1"/>
+              </a:effectRef>
+              <a:fontRef idx="minor">
+                <a:schemeClr val="lt1"/>
+              </a:fontRef>
+            </p:style>
+            <p:txBody>
+              <a:bodyPr rtlCol="0" anchor="ctr"/>
+              <a:lstStyle/>
+              <a:p>
+                <a:pPr algn="ctr"/>
+                <a:endParaRPr lang="fr-FR"/>
+              </a:p>
+            </p:txBody>
+          </p:sp>
+          <p:sp>
+            <p:nvSpPr>
+              <p:cNvPr id="34" name="Rectangle à coins arrondis 33"/>
+              <p:cNvSpPr/>
+              <p:nvPr/>
+            </p:nvSpPr>
+            <p:spPr>
+              <a:xfrm>
+                <a:off x="1066193" y="2463800"/>
+                <a:ext cx="146657" cy="95250"/>
+              </a:xfrm>
+              <a:prstGeom prst="roundRect">
+                <a:avLst/>
+              </a:prstGeom>
+            </p:spPr>
+            <p:style>
+              <a:lnRef idx="2">
+                <a:schemeClr val="accent1">
+                  <a:shade val="50000"/>
+                </a:schemeClr>
+              </a:lnRef>
+              <a:fillRef idx="1">
+                <a:schemeClr val="accent1"/>
+              </a:fillRef>
+              <a:effectRef idx="0">
+                <a:schemeClr val="accent1"/>
+              </a:effectRef>
+              <a:fontRef idx="minor">
+                <a:schemeClr val="lt1"/>
+              </a:fontRef>
+            </p:style>
+            <p:txBody>
+              <a:bodyPr rtlCol="0" anchor="ctr"/>
+              <a:lstStyle/>
+              <a:p>
+                <a:pPr algn="ctr"/>
+                <a:endParaRPr lang="fr-FR"/>
+              </a:p>
+            </p:txBody>
+          </p:sp>
+          <p:grpSp>
+            <p:nvGrpSpPr>
+              <p:cNvPr id="9" name="Groupe 8"/>
+              <p:cNvGrpSpPr/>
+              <p:nvPr/>
+            </p:nvGrpSpPr>
+            <p:grpSpPr>
+              <a:xfrm>
+                <a:off x="688962" y="583533"/>
+                <a:ext cx="1948930" cy="2179229"/>
+                <a:chOff x="1084416" y="1814733"/>
+                <a:chExt cx="1948930" cy="2423973"/>
+              </a:xfrm>
+            </p:grpSpPr>
+            <p:sp>
+              <p:nvSpPr>
+                <p:cNvPr id="5" name="Rectangle à coins arrondis 4"/>
+                <p:cNvSpPr/>
+                <p:nvPr/>
+              </p:nvSpPr>
+              <p:spPr>
+                <a:xfrm>
+                  <a:off x="1084416" y="1814733"/>
+                  <a:ext cx="1948930" cy="2423973"/>
+                </a:xfrm>
+                <a:prstGeom prst="roundRect">
+                  <a:avLst>
+                    <a:gd name="adj" fmla="val 1827"/>
+                  </a:avLst>
+                </a:prstGeom>
+              </p:spPr>
+              <p:style>
+                <a:lnRef idx="1">
+                  <a:schemeClr val="accent3"/>
+                </a:lnRef>
+                <a:fillRef idx="2">
+                  <a:schemeClr val="accent3"/>
+                </a:fillRef>
+                <a:effectRef idx="1">
+                  <a:schemeClr val="accent3"/>
+                </a:effectRef>
+                <a:fontRef idx="minor">
+                  <a:schemeClr val="dk1"/>
+                </a:fontRef>
+              </p:style>
+              <p:txBody>
+                <a:bodyPr rtlCol="0" anchor="ctr"/>
+                <a:lstStyle/>
+                <a:p>
+                  <a:pPr algn="ctr"/>
+                  <a:endParaRPr lang="fr-FR" dirty="0"/>
+                </a:p>
+              </p:txBody>
+            </p:sp>
+            <p:cxnSp>
+              <p:nvCxnSpPr>
+                <p:cNvPr id="7" name="Connecteur droit 6"/>
+                <p:cNvCxnSpPr/>
+                <p:nvPr/>
+              </p:nvCxnSpPr>
+              <p:spPr>
+                <a:xfrm>
+                  <a:off x="1084416" y="2321184"/>
+                  <a:ext cx="1948930" cy="0"/>
+                </a:xfrm>
+                <a:prstGeom prst="line">
+                  <a:avLst/>
+                </a:prstGeom>
+              </p:spPr>
+              <p:style>
+                <a:lnRef idx="1">
+                  <a:schemeClr val="accent3"/>
+                </a:lnRef>
+                <a:fillRef idx="0">
+                  <a:schemeClr val="accent3"/>
+                </a:fillRef>
+                <a:effectRef idx="0">
+                  <a:schemeClr val="accent3"/>
+                </a:effectRef>
+                <a:fontRef idx="minor">
+                  <a:schemeClr val="tx1"/>
+                </a:fontRef>
+              </p:style>
+            </p:cxnSp>
+            <p:sp>
+              <p:nvSpPr>
+                <p:cNvPr id="8" name="ZoneTexte 7"/>
+                <p:cNvSpPr txBox="1"/>
+                <p:nvPr/>
+              </p:nvSpPr>
+              <p:spPr>
+                <a:xfrm>
+                  <a:off x="1712472" y="1815767"/>
+                  <a:ext cx="692818" cy="369332"/>
+                </a:xfrm>
+                <a:prstGeom prst="rect">
+                  <a:avLst/>
+                </a:prstGeom>
+                <a:noFill/>
+              </p:spPr>
+              <p:txBody>
+                <a:bodyPr wrap="none" rtlCol="0">
+                  <a:spAutoFit/>
+                </a:bodyPr>
+                <a:lstStyle/>
+                <a:p>
+                  <a:r>
+                    <a:rPr lang="fr-FR" dirty="0" err="1" smtClean="0"/>
+                    <a:t>Node</a:t>
+                  </a:r>
+                  <a:endParaRPr lang="fr-FR" dirty="0"/>
+                </a:p>
+              </p:txBody>
+            </p:sp>
+          </p:grpSp>
         </p:grpSp>
+        <p:sp>
+          <p:nvSpPr>
+            <p:cNvPr id="2" name="ZoneTexte 1"/>
+            <p:cNvSpPr txBox="1"/>
+            <p:nvPr/>
+          </p:nvSpPr>
+          <p:spPr>
+            <a:xfrm>
+              <a:off x="1837097" y="1709243"/>
+              <a:ext cx="1705353" cy="738664"/>
+            </a:xfrm>
+            <a:prstGeom prst="rect">
+              <a:avLst/>
+            </a:prstGeom>
+            <a:noFill/>
+          </p:spPr>
+          <p:txBody>
+            <a:bodyPr wrap="square" rtlCol="0">
+              <a:spAutoFit/>
+            </a:bodyPr>
+            <a:lstStyle/>
+            <a:p>
+              <a:pPr marL="285750" indent="-285750">
+                <a:buFontTx/>
+                <a:buChar char="-"/>
+              </a:pPr>
+              <a:r>
+                <a:rPr lang="fr-FR" sz="1400" dirty="0" smtClean="0"/>
+                <a:t>id</a:t>
+              </a:r>
+            </a:p>
+            <a:p>
+              <a:pPr marL="285750" indent="-285750">
+                <a:buFontTx/>
+                <a:buChar char="-"/>
+              </a:pPr>
+              <a:r>
+                <a:rPr lang="fr-FR" sz="1400" dirty="0" smtClean="0"/>
+                <a:t>Slots</a:t>
+              </a:r>
+            </a:p>
+            <a:p>
+              <a:pPr marL="285750" indent="-285750">
+                <a:buFontTx/>
+                <a:buChar char="-"/>
+              </a:pPr>
+              <a:r>
+                <a:rPr lang="fr-FR" sz="1400" dirty="0" err="1" smtClean="0"/>
+                <a:t>Signals</a:t>
+              </a:r>
+              <a:endParaRPr lang="fr-FR" sz="1400" dirty="0"/>
+            </a:p>
+          </p:txBody>
+        </p:sp>
       </p:grpSp>
-      <p:sp>
-        <p:nvSpPr>
-          <p:cNvPr id="2" name="ZoneTexte 1"/>
-          <p:cNvSpPr txBox="1"/>
-          <p:nvPr/>
-        </p:nvSpPr>
-        <p:spPr>
-          <a:xfrm>
-            <a:off x="1837097" y="1709243"/>
-            <a:ext cx="1705353" cy="738664"/>
-          </a:xfrm>
-          <a:prstGeom prst="rect">
-            <a:avLst/>
-          </a:prstGeom>
-          <a:noFill/>
-        </p:spPr>
-        <p:txBody>
-          <a:bodyPr wrap="square" rtlCol="0">
-            <a:spAutoFit/>
-          </a:bodyPr>
-          <a:lstStyle/>
-          <a:p>
-            <a:pPr marL="285750" indent="-285750">
-              <a:buFontTx/>
-              <a:buChar char="-"/>
-            </a:pPr>
-            <a:r>
-              <a:rPr lang="fr-FR" sz="1400" dirty="0" smtClean="0"/>
-              <a:t>id</a:t>
-            </a:r>
-          </a:p>
-          <a:p>
-            <a:pPr marL="285750" indent="-285750">
-              <a:buFontTx/>
-              <a:buChar char="-"/>
-            </a:pPr>
-            <a:r>
-              <a:rPr lang="fr-FR" sz="1400" dirty="0" smtClean="0"/>
-              <a:t>Slots</a:t>
-            </a:r>
-          </a:p>
-          <a:p>
-            <a:pPr marL="285750" indent="-285750">
-              <a:buFontTx/>
-              <a:buChar char="-"/>
-            </a:pPr>
-            <a:r>
-              <a:rPr lang="fr-FR" sz="1400" dirty="0" err="1" smtClean="0"/>
-              <a:t>Signals</a:t>
-            </a:r>
-            <a:endParaRPr lang="fr-FR" sz="1400" dirty="0"/>
-          </a:p>
-        </p:txBody>
-      </p:sp>
     </p:spTree>
     <p:extLst>
       <p:ext uri="{BB962C8B-B14F-4D97-AF65-F5344CB8AC3E}">
@@ -3799,485 +3775,16 @@
       </p:grpSpPr>
       <p:grpSp>
         <p:nvGrpSpPr>
-          <p:cNvPr id="57" name="Groupe 56"/>
-          <p:cNvGrpSpPr/>
-          <p:nvPr/>
-        </p:nvGrpSpPr>
-        <p:grpSpPr>
-          <a:xfrm>
-            <a:off x="711649" y="1123950"/>
-            <a:ext cx="2152059" cy="768350"/>
-            <a:chOff x="711649" y="1123950"/>
-            <a:chExt cx="2152059" cy="768350"/>
-          </a:xfrm>
-        </p:grpSpPr>
-        <p:grpSp>
-          <p:nvGrpSpPr>
-            <p:cNvPr id="29" name="Groupe 28"/>
-            <p:cNvGrpSpPr/>
-            <p:nvPr/>
-          </p:nvGrpSpPr>
-          <p:grpSpPr>
-            <a:xfrm>
-              <a:off x="806899" y="1123950"/>
-              <a:ext cx="2044180" cy="768350"/>
-              <a:chOff x="806899" y="1123950"/>
-              <a:chExt cx="2044180" cy="768350"/>
-            </a:xfrm>
-          </p:grpSpPr>
-          <p:grpSp>
-            <p:nvGrpSpPr>
-              <p:cNvPr id="4" name="Groupe 3"/>
-              <p:cNvGrpSpPr/>
-              <p:nvPr/>
-            </p:nvGrpSpPr>
-            <p:grpSpPr>
-              <a:xfrm>
-                <a:off x="806899" y="1123950"/>
-                <a:ext cx="1948930" cy="768350"/>
-                <a:chOff x="688962" y="583534"/>
-                <a:chExt cx="1948930" cy="2032666"/>
-              </a:xfrm>
-            </p:grpSpPr>
-            <p:sp>
-              <p:nvSpPr>
-                <p:cNvPr id="5" name="Rectangle à coins arrondis 4"/>
-                <p:cNvSpPr/>
-                <p:nvPr/>
-              </p:nvSpPr>
-              <p:spPr>
-                <a:xfrm>
-                  <a:off x="1317018" y="2463800"/>
-                  <a:ext cx="146657" cy="95250"/>
-                </a:xfrm>
-                <a:prstGeom prst="roundRect">
-                  <a:avLst/>
-                </a:prstGeom>
-              </p:spPr>
-              <p:style>
-                <a:lnRef idx="2">
-                  <a:schemeClr val="accent1">
-                    <a:shade val="50000"/>
-                  </a:schemeClr>
-                </a:lnRef>
-                <a:fillRef idx="1">
-                  <a:schemeClr val="accent1"/>
-                </a:fillRef>
-                <a:effectRef idx="0">
-                  <a:schemeClr val="accent1"/>
-                </a:effectRef>
-                <a:fontRef idx="minor">
-                  <a:schemeClr val="lt1"/>
-                </a:fontRef>
-              </p:style>
-              <p:txBody>
-                <a:bodyPr rtlCol="0" anchor="ctr"/>
-                <a:lstStyle/>
-                <a:p>
-                  <a:pPr algn="ctr"/>
-                  <a:endParaRPr lang="fr-FR"/>
-                </a:p>
-              </p:txBody>
-            </p:sp>
-            <p:sp>
-              <p:nvSpPr>
-                <p:cNvPr id="6" name="Rectangle à coins arrondis 5"/>
-                <p:cNvSpPr/>
-                <p:nvPr/>
-              </p:nvSpPr>
-              <p:spPr>
-                <a:xfrm>
-                  <a:off x="1566434" y="2463800"/>
-                  <a:ext cx="146657" cy="95250"/>
-                </a:xfrm>
-                <a:prstGeom prst="roundRect">
-                  <a:avLst/>
-                </a:prstGeom>
-              </p:spPr>
-              <p:style>
-                <a:lnRef idx="2">
-                  <a:schemeClr val="accent1">
-                    <a:shade val="50000"/>
-                  </a:schemeClr>
-                </a:lnRef>
-                <a:fillRef idx="1">
-                  <a:schemeClr val="accent1"/>
-                </a:fillRef>
-                <a:effectRef idx="0">
-                  <a:schemeClr val="accent1"/>
-                </a:effectRef>
-                <a:fontRef idx="minor">
-                  <a:schemeClr val="lt1"/>
-                </a:fontRef>
-              </p:style>
-              <p:txBody>
-                <a:bodyPr rtlCol="0" anchor="ctr"/>
-                <a:lstStyle/>
-                <a:p>
-                  <a:pPr algn="ctr"/>
-                  <a:endParaRPr lang="fr-FR"/>
-                </a:p>
-              </p:txBody>
-            </p:sp>
-            <p:sp>
-              <p:nvSpPr>
-                <p:cNvPr id="7" name="Rectangle à coins arrondis 6"/>
-                <p:cNvSpPr/>
-                <p:nvPr/>
-              </p:nvSpPr>
-              <p:spPr>
-                <a:xfrm>
-                  <a:off x="1825072" y="2463800"/>
-                  <a:ext cx="146657" cy="95250"/>
-                </a:xfrm>
-                <a:prstGeom prst="roundRect">
-                  <a:avLst/>
-                </a:prstGeom>
-              </p:spPr>
-              <p:style>
-                <a:lnRef idx="2">
-                  <a:schemeClr val="accent1">
-                    <a:shade val="50000"/>
-                  </a:schemeClr>
-                </a:lnRef>
-                <a:fillRef idx="1">
-                  <a:schemeClr val="accent1"/>
-                </a:fillRef>
-                <a:effectRef idx="0">
-                  <a:schemeClr val="accent1"/>
-                </a:effectRef>
-                <a:fontRef idx="minor">
-                  <a:schemeClr val="lt1"/>
-                </a:fontRef>
-              </p:style>
-              <p:txBody>
-                <a:bodyPr rtlCol="0" anchor="ctr"/>
-                <a:lstStyle/>
-                <a:p>
-                  <a:pPr algn="ctr"/>
-                  <a:endParaRPr lang="fr-FR"/>
-                </a:p>
-              </p:txBody>
-            </p:sp>
-            <p:sp>
-              <p:nvSpPr>
-                <p:cNvPr id="8" name="Rectangle à coins arrondis 7"/>
-                <p:cNvSpPr/>
-                <p:nvPr/>
-              </p:nvSpPr>
-              <p:spPr>
-                <a:xfrm>
-                  <a:off x="2094893" y="2463800"/>
-                  <a:ext cx="146657" cy="95250"/>
-                </a:xfrm>
-                <a:prstGeom prst="roundRect">
-                  <a:avLst/>
-                </a:prstGeom>
-              </p:spPr>
-              <p:style>
-                <a:lnRef idx="2">
-                  <a:schemeClr val="accent1">
-                    <a:shade val="50000"/>
-                  </a:schemeClr>
-                </a:lnRef>
-                <a:fillRef idx="1">
-                  <a:schemeClr val="accent1"/>
-                </a:fillRef>
-                <a:effectRef idx="0">
-                  <a:schemeClr val="accent1"/>
-                </a:effectRef>
-                <a:fontRef idx="minor">
-                  <a:schemeClr val="lt1"/>
-                </a:fontRef>
-              </p:style>
-              <p:txBody>
-                <a:bodyPr rtlCol="0" anchor="ctr"/>
-                <a:lstStyle/>
-                <a:p>
-                  <a:pPr algn="ctr"/>
-                  <a:endParaRPr lang="fr-FR"/>
-                </a:p>
-              </p:txBody>
-            </p:sp>
-            <p:sp>
-              <p:nvSpPr>
-                <p:cNvPr id="9" name="Rectangle à coins arrondis 8"/>
-                <p:cNvSpPr/>
-                <p:nvPr/>
-              </p:nvSpPr>
-              <p:spPr>
-                <a:xfrm>
-                  <a:off x="1066193" y="2463800"/>
-                  <a:ext cx="146657" cy="95250"/>
-                </a:xfrm>
-                <a:prstGeom prst="roundRect">
-                  <a:avLst/>
-                </a:prstGeom>
-              </p:spPr>
-              <p:style>
-                <a:lnRef idx="2">
-                  <a:schemeClr val="accent1">
-                    <a:shade val="50000"/>
-                  </a:schemeClr>
-                </a:lnRef>
-                <a:fillRef idx="1">
-                  <a:schemeClr val="accent1"/>
-                </a:fillRef>
-                <a:effectRef idx="0">
-                  <a:schemeClr val="accent1"/>
-                </a:effectRef>
-                <a:fontRef idx="minor">
-                  <a:schemeClr val="lt1"/>
-                </a:fontRef>
-              </p:style>
-              <p:txBody>
-                <a:bodyPr rtlCol="0" anchor="ctr"/>
-                <a:lstStyle/>
-                <a:p>
-                  <a:pPr algn="ctr"/>
-                  <a:endParaRPr lang="fr-FR"/>
-                </a:p>
-              </p:txBody>
-            </p:sp>
-            <p:sp>
-              <p:nvSpPr>
-                <p:cNvPr id="10" name="Rectangle à coins arrondis 9"/>
-                <p:cNvSpPr/>
-                <p:nvPr/>
-              </p:nvSpPr>
-              <p:spPr>
-                <a:xfrm>
-                  <a:off x="2358418" y="2463800"/>
-                  <a:ext cx="146657" cy="95250"/>
-                </a:xfrm>
-                <a:prstGeom prst="roundRect">
-                  <a:avLst/>
-                </a:prstGeom>
-              </p:spPr>
-              <p:style>
-                <a:lnRef idx="2">
-                  <a:schemeClr val="accent1">
-                    <a:shade val="50000"/>
-                  </a:schemeClr>
-                </a:lnRef>
-                <a:fillRef idx="1">
-                  <a:schemeClr val="accent1"/>
-                </a:fillRef>
-                <a:effectRef idx="0">
-                  <a:schemeClr val="accent1"/>
-                </a:effectRef>
-                <a:fontRef idx="minor">
-                  <a:schemeClr val="lt1"/>
-                </a:fontRef>
-              </p:style>
-              <p:txBody>
-                <a:bodyPr rtlCol="0" anchor="ctr"/>
-                <a:lstStyle/>
-                <a:p>
-                  <a:pPr algn="ctr"/>
-                  <a:endParaRPr lang="fr-FR"/>
-                </a:p>
-              </p:txBody>
-            </p:sp>
-            <p:sp>
-              <p:nvSpPr>
-                <p:cNvPr id="12" name="Rectangle à coins arrondis 11"/>
-                <p:cNvSpPr/>
-                <p:nvPr/>
-              </p:nvSpPr>
-              <p:spPr>
-                <a:xfrm>
-                  <a:off x="688962" y="583534"/>
-                  <a:ext cx="1948930" cy="2032666"/>
-                </a:xfrm>
-                <a:prstGeom prst="roundRect">
-                  <a:avLst>
-                    <a:gd name="adj" fmla="val 1827"/>
-                  </a:avLst>
-                </a:prstGeom>
-              </p:spPr>
-              <p:style>
-                <a:lnRef idx="1">
-                  <a:schemeClr val="accent3"/>
-                </a:lnRef>
-                <a:fillRef idx="2">
-                  <a:schemeClr val="accent3"/>
-                </a:fillRef>
-                <a:effectRef idx="1">
-                  <a:schemeClr val="accent3"/>
-                </a:effectRef>
-                <a:fontRef idx="minor">
-                  <a:schemeClr val="dk1"/>
-                </a:fontRef>
-              </p:style>
-              <p:txBody>
-                <a:bodyPr rtlCol="0" anchor="ctr"/>
-                <a:lstStyle/>
-                <a:p>
-                  <a:pPr algn="ctr"/>
-                  <a:endParaRPr lang="fr-FR" dirty="0"/>
-                </a:p>
-              </p:txBody>
-            </p:sp>
-          </p:grpSp>
-          <p:sp>
-            <p:nvSpPr>
-              <p:cNvPr id="27" name="Rectangle à coins arrondis 26"/>
-              <p:cNvSpPr/>
-              <p:nvPr/>
-            </p:nvSpPr>
-            <p:spPr>
-              <a:xfrm>
-                <a:off x="2660579" y="1241424"/>
-                <a:ext cx="190500" cy="200025"/>
-              </a:xfrm>
-              <a:prstGeom prst="roundRect">
-                <a:avLst/>
-              </a:prstGeom>
-            </p:spPr>
-            <p:style>
-              <a:lnRef idx="1">
-                <a:schemeClr val="accent2"/>
-              </a:lnRef>
-              <a:fillRef idx="2">
-                <a:schemeClr val="accent2"/>
-              </a:fillRef>
-              <a:effectRef idx="1">
-                <a:schemeClr val="accent2"/>
-              </a:effectRef>
-              <a:fontRef idx="minor">
-                <a:schemeClr val="dk1"/>
-              </a:fontRef>
-            </p:style>
-            <p:txBody>
-              <a:bodyPr rtlCol="0" anchor="ctr"/>
-              <a:lstStyle/>
-              <a:p>
-                <a:pPr algn="ctr"/>
-                <a:endParaRPr lang="fr-FR"/>
-              </a:p>
-            </p:txBody>
-          </p:sp>
-          <p:sp>
-            <p:nvSpPr>
-              <p:cNvPr id="28" name="ZoneTexte 27"/>
-              <p:cNvSpPr txBox="1"/>
-              <p:nvPr/>
-            </p:nvSpPr>
-            <p:spPr>
-              <a:xfrm>
-                <a:off x="1390781" y="1292224"/>
-                <a:ext cx="625556" cy="369332"/>
-              </a:xfrm>
-              <a:prstGeom prst="rect">
-                <a:avLst/>
-              </a:prstGeom>
-              <a:noFill/>
-            </p:spPr>
-            <p:txBody>
-              <a:bodyPr wrap="none" rtlCol="0">
-                <a:spAutoFit/>
-              </a:bodyPr>
-              <a:lstStyle/>
-              <a:p>
-                <a:r>
-                  <a:rPr lang="fr-FR" dirty="0" err="1" smtClean="0"/>
-                  <a:t>Root</a:t>
-                </a:r>
-                <a:endParaRPr lang="fr-FR" dirty="0"/>
-              </a:p>
-            </p:txBody>
-          </p:sp>
-        </p:grpSp>
-        <p:sp>
-          <p:nvSpPr>
-            <p:cNvPr id="41" name="Rectangle à coins arrondis 40"/>
-            <p:cNvSpPr/>
-            <p:nvPr/>
-          </p:nvSpPr>
-          <p:spPr>
-            <a:xfrm>
-              <a:off x="2673208" y="1546739"/>
-              <a:ext cx="190500" cy="200025"/>
-            </a:xfrm>
-            <a:prstGeom prst="roundRect">
-              <a:avLst/>
-            </a:prstGeom>
-          </p:spPr>
-          <p:style>
-            <a:lnRef idx="1">
-              <a:schemeClr val="accent2"/>
-            </a:lnRef>
-            <a:fillRef idx="2">
-              <a:schemeClr val="accent2"/>
-            </a:fillRef>
-            <a:effectRef idx="1">
-              <a:schemeClr val="accent2"/>
-            </a:effectRef>
-            <a:fontRef idx="minor">
-              <a:schemeClr val="dk1"/>
-            </a:fontRef>
-          </p:style>
-          <p:txBody>
-            <a:bodyPr rtlCol="0" anchor="ctr"/>
-            <a:lstStyle/>
-            <a:p>
-              <a:pPr algn="ctr"/>
-              <a:endParaRPr lang="fr-FR"/>
-            </a:p>
-          </p:txBody>
-        </p:sp>
-        <p:sp>
-          <p:nvSpPr>
-            <p:cNvPr id="42" name="Rectangle à coins arrondis 41"/>
-            <p:cNvSpPr/>
-            <p:nvPr/>
-          </p:nvSpPr>
-          <p:spPr>
-            <a:xfrm>
-              <a:off x="711649" y="1408112"/>
-              <a:ext cx="190500" cy="200025"/>
-            </a:xfrm>
-            <a:prstGeom prst="roundRect">
-              <a:avLst/>
-            </a:prstGeom>
-          </p:spPr>
-          <p:style>
-            <a:lnRef idx="1">
-              <a:schemeClr val="accent1"/>
-            </a:lnRef>
-            <a:fillRef idx="2">
-              <a:schemeClr val="accent1"/>
-            </a:fillRef>
-            <a:effectRef idx="1">
-              <a:schemeClr val="accent1"/>
-            </a:effectRef>
-            <a:fontRef idx="minor">
-              <a:schemeClr val="dk1"/>
-            </a:fontRef>
-          </p:style>
-          <p:txBody>
-            <a:bodyPr rtlCol="0" anchor="ctr"/>
-            <a:lstStyle/>
-            <a:p>
-              <a:pPr algn="ctr"/>
-              <a:endParaRPr lang="fr-FR"/>
-            </a:p>
-          </p:txBody>
-        </p:sp>
-      </p:grpSp>
-      <p:grpSp>
-        <p:nvGrpSpPr>
           <p:cNvPr id="56" name="Groupe 55"/>
           <p:cNvGrpSpPr/>
           <p:nvPr/>
         </p:nvGrpSpPr>
         <p:grpSpPr>
           <a:xfrm>
-            <a:off x="4197943" y="2389350"/>
-            <a:ext cx="2152059" cy="768350"/>
+            <a:off x="4171680" y="657611"/>
+            <a:ext cx="4077250" cy="1458224"/>
             <a:chOff x="3683449" y="3473450"/>
-            <a:chExt cx="2152059" cy="768350"/>
+            <a:chExt cx="2231667" cy="768350"/>
           </a:xfrm>
         </p:grpSpPr>
         <p:grpSp>
@@ -4597,8 +4104,8 @@
             </p:nvSpPr>
             <p:spPr>
               <a:xfrm>
-                <a:off x="895481" y="1292224"/>
-                <a:ext cx="1824025" cy="369332"/>
+                <a:off x="1308307" y="1292224"/>
+                <a:ext cx="998373" cy="194604"/>
               </a:xfrm>
               <a:prstGeom prst="rect">
                 <a:avLst/>
@@ -4611,6 +4118,7 @@
               </a:bodyPr>
               <a:lstStyle/>
               <a:p>
+                <a:pPr algn="ctr"/>
                 <a:r>
                   <a:rPr lang="fr-FR" dirty="0" err="1" smtClean="0"/>
                   <a:t>MysqlConnection</a:t>
@@ -4628,8 +4136,8 @@
           </p:nvSpPr>
           <p:spPr>
             <a:xfrm>
-              <a:off x="5645008" y="3769239"/>
-              <a:ext cx="190500" cy="200025"/>
+              <a:off x="5521483" y="3720860"/>
+              <a:ext cx="393633" cy="297195"/>
             </a:xfrm>
             <a:prstGeom prst="roundRect">
               <a:avLst/>
@@ -4670,8 +4178,8 @@
           </p:nvSpPr>
           <p:spPr>
             <a:xfrm>
-              <a:off x="3683449" y="3757612"/>
-              <a:ext cx="190500" cy="200025"/>
+              <a:off x="3683449" y="3799235"/>
+              <a:ext cx="258766" cy="218820"/>
             </a:xfrm>
             <a:prstGeom prst="roundRect">
               <a:avLst/>
@@ -4711,9 +4219,9 @@
           <p:nvPr/>
         </p:nvCxnSpPr>
         <p:spPr>
-          <a:xfrm>
-            <a:off x="2863708" y="1646752"/>
-            <a:ext cx="1334235" cy="1126773"/>
+          <a:xfrm flipV="1">
+            <a:off x="3333174" y="1483553"/>
+            <a:ext cx="838506" cy="384756"/>
           </a:xfrm>
           <a:prstGeom prst="bentConnector3">
             <a:avLst>
@@ -4750,14 +4258,14 @@
         </p:nvCxnSpPr>
         <p:spPr>
           <a:xfrm flipH="1">
-            <a:off x="4845625" y="2785152"/>
-            <a:ext cx="1504377" cy="1834797"/>
+            <a:off x="3934069" y="1409180"/>
+            <a:ext cx="4314861" cy="2802093"/>
           </a:xfrm>
           <a:prstGeom prst="bentConnector5">
             <a:avLst>
-              <a:gd name="adj1" fmla="val -15196"/>
-              <a:gd name="adj2" fmla="val 50000"/>
-              <a:gd name="adj3" fmla="val 115196"/>
+              <a:gd name="adj1" fmla="val -5298"/>
+              <a:gd name="adj2" fmla="val 50894"/>
+              <a:gd name="adj3" fmla="val 105298"/>
             </a:avLst>
           </a:prstGeom>
           <a:ln>
@@ -4790,14 +4298,14 @@
         </p:nvCxnSpPr>
         <p:spPr>
           <a:xfrm flipH="1">
-            <a:off x="4918934" y="4466476"/>
-            <a:ext cx="2078750" cy="1321873"/>
+            <a:off x="4434971" y="3884890"/>
+            <a:ext cx="2990777" cy="1606296"/>
           </a:xfrm>
           <a:prstGeom prst="bentConnector5">
             <a:avLst>
-              <a:gd name="adj1" fmla="val -10997"/>
-              <a:gd name="adj2" fmla="val 50000"/>
-              <a:gd name="adj3" fmla="val 110997"/>
+              <a:gd name="adj1" fmla="val -7643"/>
+              <a:gd name="adj2" fmla="val 50123"/>
+              <a:gd name="adj3" fmla="val 107643"/>
             </a:avLst>
           </a:prstGeom>
           <a:ln>
@@ -4827,8 +4335,8 @@
         </p:nvGrpSpPr>
         <p:grpSpPr>
           <a:xfrm>
-            <a:off x="4832925" y="4083374"/>
-            <a:ext cx="2164759" cy="768350"/>
+            <a:off x="3913463" y="3207886"/>
+            <a:ext cx="3512285" cy="1357802"/>
             <a:chOff x="4832925" y="4083374"/>
             <a:chExt cx="2164759" cy="768350"/>
           </a:xfrm>
@@ -4856,9 +4364,9 @@
             <p:grpSpPr>
               <a:xfrm>
                 <a:off x="3778699" y="3473450"/>
-                <a:ext cx="1948930" cy="768350"/>
+                <a:ext cx="1948931" cy="768350"/>
                 <a:chOff x="806899" y="1123950"/>
-                <a:chExt cx="1948930" cy="768350"/>
+                <a:chExt cx="1948931" cy="768350"/>
               </a:xfrm>
             </p:grpSpPr>
             <p:grpSp>
@@ -5164,8 +4672,8 @@
               </p:nvSpPr>
               <p:spPr>
                 <a:xfrm>
-                  <a:off x="1149481" y="1292224"/>
-                  <a:ext cx="1326645" cy="369332"/>
+                  <a:off x="815414" y="1409057"/>
+                  <a:ext cx="1940416" cy="208997"/>
                 </a:xfrm>
                 <a:prstGeom prst="rect">
                   <a:avLst/>
@@ -5173,11 +4681,12 @@
                 <a:noFill/>
               </p:spPr>
               <p:txBody>
-                <a:bodyPr wrap="none" rtlCol="0">
+                <a:bodyPr wrap="square" rtlCol="0">
                   <a:spAutoFit/>
                 </a:bodyPr>
                 <a:lstStyle/>
                 <a:p>
+                  <a:pPr algn="ctr"/>
                   <a:r>
                     <a:rPr lang="fr-FR" dirty="0" err="1" smtClean="0"/>
                     <a:t>MysqlQuery</a:t>
@@ -5238,7 +4747,7 @@
             <p:spPr>
               <a:xfrm>
                 <a:off x="3683449" y="3910012"/>
-                <a:ext cx="190500" cy="200025"/>
+                <a:ext cx="253706" cy="262464"/>
               </a:xfrm>
               <a:prstGeom prst="roundRect">
                 <a:avLst/>
@@ -5280,8 +4789,8 @@
           </p:nvSpPr>
           <p:spPr>
             <a:xfrm>
-              <a:off x="4832925" y="4227836"/>
-              <a:ext cx="190500" cy="200025"/>
+              <a:off x="4832925" y="4191783"/>
+              <a:ext cx="266406" cy="236079"/>
             </a:xfrm>
             <a:prstGeom prst="roundRect">
               <a:avLst/>
@@ -5311,65 +4820,315 @@
           </p:txBody>
         </p:sp>
       </p:grpSp>
+      <p:sp>
+        <p:nvSpPr>
+          <p:cNvPr id="2" name="ZoneTexte 1"/>
+          <p:cNvSpPr txBox="1"/>
+          <p:nvPr/>
+        </p:nvSpPr>
+        <p:spPr>
+          <a:xfrm>
+            <a:off x="7830818" y="2681620"/>
+            <a:ext cx="545342" cy="246221"/>
+          </a:xfrm>
+          <a:prstGeom prst="rect">
+            <a:avLst/>
+          </a:prstGeom>
+          <a:noFill/>
+        </p:spPr>
+        <p:txBody>
+          <a:bodyPr wrap="none" rtlCol="0">
+            <a:spAutoFit/>
+          </a:bodyPr>
+          <a:lstStyle/>
+          <a:p>
+            <a:r>
+              <a:rPr lang="fr-FR" sz="1000" dirty="0" err="1" smtClean="0"/>
+              <a:t>getCnx</a:t>
+            </a:r>
+            <a:endParaRPr lang="fr-FR" sz="1000" dirty="0"/>
+          </a:p>
+        </p:txBody>
+      </p:sp>
+      <p:sp>
+        <p:nvSpPr>
+          <p:cNvPr id="62" name="ZoneTexte 61"/>
+          <p:cNvSpPr txBox="1"/>
+          <p:nvPr/>
+        </p:nvSpPr>
+        <p:spPr>
+          <a:xfrm>
+            <a:off x="3303548" y="4088162"/>
+            <a:ext cx="545342" cy="246221"/>
+          </a:xfrm>
+          <a:prstGeom prst="rect">
+            <a:avLst/>
+          </a:prstGeom>
+          <a:noFill/>
+        </p:spPr>
+        <p:txBody>
+          <a:bodyPr wrap="none" rtlCol="0">
+            <a:spAutoFit/>
+          </a:bodyPr>
+          <a:lstStyle/>
+          <a:p>
+            <a:r>
+              <a:rPr lang="fr-FR" sz="1000" dirty="0" err="1" smtClean="0"/>
+              <a:t>getCnx</a:t>
+            </a:r>
+            <a:endParaRPr lang="fr-FR" sz="1000" dirty="0"/>
+          </a:p>
+        </p:txBody>
+      </p:sp>
+      <p:sp>
+        <p:nvSpPr>
+          <p:cNvPr id="68" name="ZoneTexte 67"/>
+          <p:cNvSpPr txBox="1"/>
+          <p:nvPr/>
+        </p:nvSpPr>
+        <p:spPr>
+          <a:xfrm>
+            <a:off x="7495873" y="3664491"/>
+            <a:ext cx="580608" cy="246221"/>
+          </a:xfrm>
+          <a:prstGeom prst="rect">
+            <a:avLst/>
+          </a:prstGeom>
+          <a:noFill/>
+        </p:spPr>
+        <p:txBody>
+          <a:bodyPr wrap="none" rtlCol="0">
+            <a:spAutoFit/>
+          </a:bodyPr>
+          <a:lstStyle/>
+          <a:p>
+            <a:r>
+              <a:rPr lang="fr-FR" sz="1000" dirty="0" err="1" smtClean="0"/>
+              <a:t>getRow</a:t>
+            </a:r>
+            <a:endParaRPr lang="fr-FR" sz="1000" dirty="0"/>
+          </a:p>
+        </p:txBody>
+      </p:sp>
+      <p:sp>
+        <p:nvSpPr>
+          <p:cNvPr id="79" name="Pentagone 78"/>
+          <p:cNvSpPr/>
+          <p:nvPr/>
+        </p:nvSpPr>
+        <p:spPr>
+          <a:xfrm rot="5400000">
+            <a:off x="5480579" y="536648"/>
+            <a:ext cx="219737" cy="238427"/>
+          </a:xfrm>
+          <a:prstGeom prst="homePlate">
+            <a:avLst>
+              <a:gd name="adj" fmla="val 49048"/>
+            </a:avLst>
+          </a:prstGeom>
+        </p:spPr>
+        <p:style>
+          <a:lnRef idx="1">
+            <a:schemeClr val="dk1"/>
+          </a:lnRef>
+          <a:fillRef idx="2">
+            <a:schemeClr val="dk1"/>
+          </a:fillRef>
+          <a:effectRef idx="1">
+            <a:schemeClr val="dk1"/>
+          </a:effectRef>
+          <a:fontRef idx="minor">
+            <a:schemeClr val="dk1"/>
+          </a:fontRef>
+        </p:style>
+        <p:txBody>
+          <a:bodyPr vert="vert270" rtlCol="0" anchor="ctr"/>
+          <a:lstStyle/>
+          <a:p>
+            <a:pPr algn="ctr"/>
+            <a:r>
+              <a:rPr lang="fr-FR" dirty="0" smtClean="0"/>
+              <a:t>u</a:t>
+            </a:r>
+            <a:endParaRPr lang="fr-FR" dirty="0"/>
+          </a:p>
+        </p:txBody>
+      </p:sp>
+      <p:sp>
+        <p:nvSpPr>
+          <p:cNvPr id="81" name="Pentagone 80"/>
+          <p:cNvSpPr/>
+          <p:nvPr/>
+        </p:nvSpPr>
+        <p:spPr>
+          <a:xfrm rot="5400000">
+            <a:off x="5784218" y="538397"/>
+            <a:ext cx="219737" cy="238427"/>
+          </a:xfrm>
+          <a:prstGeom prst="homePlate">
+            <a:avLst>
+              <a:gd name="adj" fmla="val 49048"/>
+            </a:avLst>
+          </a:prstGeom>
+        </p:spPr>
+        <p:style>
+          <a:lnRef idx="1">
+            <a:schemeClr val="dk1"/>
+          </a:lnRef>
+          <a:fillRef idx="2">
+            <a:schemeClr val="dk1"/>
+          </a:fillRef>
+          <a:effectRef idx="1">
+            <a:schemeClr val="dk1"/>
+          </a:effectRef>
+          <a:fontRef idx="minor">
+            <a:schemeClr val="dk1"/>
+          </a:fontRef>
+        </p:style>
+        <p:txBody>
+          <a:bodyPr vert="vert270" rtlCol="0" anchor="ctr"/>
+          <a:lstStyle/>
+          <a:p>
+            <a:pPr algn="ctr"/>
+            <a:r>
+              <a:rPr lang="fr-FR" dirty="0"/>
+              <a:t>p</a:t>
+            </a:r>
+          </a:p>
+        </p:txBody>
+      </p:sp>
+      <p:sp>
+        <p:nvSpPr>
+          <p:cNvPr id="83" name="Pentagone 82"/>
+          <p:cNvSpPr/>
+          <p:nvPr/>
+        </p:nvSpPr>
+        <p:spPr>
+          <a:xfrm rot="5400000">
+            <a:off x="6091041" y="535715"/>
+            <a:ext cx="219737" cy="238427"/>
+          </a:xfrm>
+          <a:prstGeom prst="homePlate">
+            <a:avLst>
+              <a:gd name="adj" fmla="val 49048"/>
+            </a:avLst>
+          </a:prstGeom>
+        </p:spPr>
+        <p:style>
+          <a:lnRef idx="1">
+            <a:schemeClr val="dk1"/>
+          </a:lnRef>
+          <a:fillRef idx="2">
+            <a:schemeClr val="dk1"/>
+          </a:fillRef>
+          <a:effectRef idx="1">
+            <a:schemeClr val="dk1"/>
+          </a:effectRef>
+          <a:fontRef idx="minor">
+            <a:schemeClr val="dk1"/>
+          </a:fontRef>
+        </p:style>
+        <p:txBody>
+          <a:bodyPr vert="vert270" rtlCol="0" anchor="ctr"/>
+          <a:lstStyle/>
+          <a:p>
+            <a:pPr algn="ctr"/>
+            <a:r>
+              <a:rPr lang="fr-FR" dirty="0"/>
+              <a:t>d</a:t>
+            </a:r>
+          </a:p>
+        </p:txBody>
+      </p:sp>
+      <p:sp>
+        <p:nvSpPr>
+          <p:cNvPr id="18" name="ZoneTexte 17"/>
+          <p:cNvSpPr txBox="1"/>
+          <p:nvPr/>
+        </p:nvSpPr>
+        <p:spPr>
+          <a:xfrm>
+            <a:off x="407037" y="3387080"/>
+            <a:ext cx="1795876" cy="369332"/>
+          </a:xfrm>
+          <a:prstGeom prst="rect">
+            <a:avLst/>
+          </a:prstGeom>
+          <a:noFill/>
+        </p:spPr>
+        <p:txBody>
+          <a:bodyPr wrap="square" rtlCol="0">
+            <a:spAutoFit/>
+          </a:bodyPr>
+          <a:lstStyle/>
+          <a:p>
+            <a:r>
+              <a:rPr lang="fr-FR" dirty="0" smtClean="0"/>
+              <a:t>C(R)= F(Signal)</a:t>
+            </a:r>
+            <a:endParaRPr lang="fr-FR" dirty="0"/>
+          </a:p>
+        </p:txBody>
+      </p:sp>
       <p:grpSp>
         <p:nvGrpSpPr>
-          <p:cNvPr id="99" name="Groupe 98"/>
+          <p:cNvPr id="26" name="Groupe 25"/>
           <p:cNvGrpSpPr/>
           <p:nvPr/>
         </p:nvGrpSpPr>
         <p:grpSpPr>
           <a:xfrm>
-            <a:off x="4918934" y="5543874"/>
-            <a:ext cx="2056880" cy="768350"/>
-            <a:chOff x="4832925" y="4083374"/>
-            <a:chExt cx="2056880" cy="768350"/>
+            <a:off x="148402" y="327175"/>
+            <a:ext cx="3184772" cy="2153099"/>
+            <a:chOff x="148402" y="651631"/>
+            <a:chExt cx="3184772" cy="2153099"/>
           </a:xfrm>
         </p:grpSpPr>
         <p:grpSp>
           <p:nvGrpSpPr>
-            <p:cNvPr id="100" name="Groupe 99"/>
+            <p:cNvPr id="57" name="Groupe 56"/>
             <p:cNvGrpSpPr/>
             <p:nvPr/>
           </p:nvGrpSpPr>
           <p:grpSpPr>
             <a:xfrm>
-              <a:off x="4845625" y="4083374"/>
-              <a:ext cx="2044180" cy="768350"/>
-              <a:chOff x="3683449" y="3473450"/>
-              <a:chExt cx="2044180" cy="768350"/>
+              <a:off x="148402" y="651631"/>
+              <a:ext cx="3184772" cy="2153099"/>
+              <a:chOff x="625240" y="588519"/>
+              <a:chExt cx="3184772" cy="2153099"/>
             </a:xfrm>
           </p:grpSpPr>
           <p:grpSp>
             <p:nvGrpSpPr>
-              <p:cNvPr id="102" name="Groupe 101"/>
+              <p:cNvPr id="29" name="Groupe 28"/>
               <p:cNvGrpSpPr/>
               <p:nvPr/>
             </p:nvGrpSpPr>
             <p:grpSpPr>
               <a:xfrm>
-                <a:off x="3778699" y="3473450"/>
-                <a:ext cx="1948930" cy="768350"/>
-                <a:chOff x="806899" y="1123950"/>
-                <a:chExt cx="1948930" cy="768350"/>
+                <a:off x="883874" y="588519"/>
+                <a:ext cx="2926138" cy="2153099"/>
+                <a:chOff x="883874" y="588519"/>
+                <a:chExt cx="2926138" cy="2153099"/>
               </a:xfrm>
             </p:grpSpPr>
             <p:grpSp>
               <p:nvGrpSpPr>
-                <p:cNvPr id="105" name="Groupe 104"/>
+                <p:cNvPr id="4" name="Groupe 3"/>
                 <p:cNvGrpSpPr/>
                 <p:nvPr/>
               </p:nvGrpSpPr>
               <p:grpSpPr>
                 <a:xfrm>
-                  <a:off x="806899" y="1123950"/>
-                  <a:ext cx="1948930" cy="768350"/>
-                  <a:chOff x="688962" y="583534"/>
-                  <a:chExt cx="1948930" cy="2032666"/>
+                  <a:off x="883874" y="588519"/>
+                  <a:ext cx="2639338" cy="2153099"/>
+                  <a:chOff x="765937" y="-832946"/>
+                  <a:chExt cx="2639338" cy="5696012"/>
                 </a:xfrm>
               </p:grpSpPr>
               <p:sp>
                 <p:nvSpPr>
-                  <p:cNvPr id="107" name="Rectangle à coins arrondis 106"/>
+                  <p:cNvPr id="5" name="Rectangle à coins arrondis 4"/>
                   <p:cNvSpPr/>
                   <p:nvPr/>
                 </p:nvSpPr>
@@ -5409,7 +5168,7 @@
               </p:sp>
               <p:sp>
                 <p:nvSpPr>
-                  <p:cNvPr id="108" name="Rectangle à coins arrondis 107"/>
+                  <p:cNvPr id="6" name="Rectangle à coins arrondis 5"/>
                   <p:cNvSpPr/>
                   <p:nvPr/>
                 </p:nvSpPr>
@@ -5449,7 +5208,7 @@
               </p:sp>
               <p:sp>
                 <p:nvSpPr>
-                  <p:cNvPr id="109" name="Rectangle à coins arrondis 108"/>
+                  <p:cNvPr id="7" name="Rectangle à coins arrondis 6"/>
                   <p:cNvSpPr/>
                   <p:nvPr/>
                 </p:nvSpPr>
@@ -5489,7 +5248,7 @@
               </p:sp>
               <p:sp>
                 <p:nvSpPr>
-                  <p:cNvPr id="110" name="Rectangle à coins arrondis 109"/>
+                  <p:cNvPr id="8" name="Rectangle à coins arrondis 7"/>
                   <p:cNvSpPr/>
                   <p:nvPr/>
                 </p:nvSpPr>
@@ -5529,7 +5288,7 @@
               </p:sp>
               <p:sp>
                 <p:nvSpPr>
-                  <p:cNvPr id="111" name="Rectangle à coins arrondis 110"/>
+                  <p:cNvPr id="9" name="Rectangle à coins arrondis 8"/>
                   <p:cNvSpPr/>
                   <p:nvPr/>
                 </p:nvSpPr>
@@ -5569,7 +5328,7 @@
               </p:sp>
               <p:sp>
                 <p:nvSpPr>
-                  <p:cNvPr id="112" name="Rectangle à coins arrondis 111"/>
+                  <p:cNvPr id="10" name="Rectangle à coins arrondis 9"/>
                   <p:cNvSpPr/>
                   <p:nvPr/>
                 </p:nvSpPr>
@@ -5609,14 +5368,14 @@
               </p:sp>
               <p:sp>
                 <p:nvSpPr>
-                  <p:cNvPr id="113" name="Rectangle à coins arrondis 112"/>
+                  <p:cNvPr id="12" name="Rectangle à coins arrondis 11"/>
                   <p:cNvSpPr/>
                   <p:nvPr/>
                 </p:nvSpPr>
                 <p:spPr>
                   <a:xfrm>
-                    <a:off x="688962" y="583534"/>
-                    <a:ext cx="1948930" cy="2032666"/>
+                    <a:off x="765937" y="-832946"/>
+                    <a:ext cx="2639338" cy="5696012"/>
                   </a:xfrm>
                   <a:prstGeom prst="roundRect">
                     <a:avLst>
@@ -5650,14 +5409,56 @@
             </p:grpSp>
             <p:sp>
               <p:nvSpPr>
-                <p:cNvPr id="106" name="ZoneTexte 105"/>
+                <p:cNvPr id="27" name="Rectangle à coins arrondis 26"/>
+                <p:cNvSpPr/>
+                <p:nvPr/>
+              </p:nvSpPr>
+              <p:spPr>
+                <a:xfrm>
+                  <a:off x="2876808" y="1042596"/>
+                  <a:ext cx="933204" cy="515091"/>
+                </a:xfrm>
+                <a:prstGeom prst="roundRect">
+                  <a:avLst/>
+                </a:prstGeom>
+              </p:spPr>
+              <p:style>
+                <a:lnRef idx="1">
+                  <a:schemeClr val="accent2"/>
+                </a:lnRef>
+                <a:fillRef idx="2">
+                  <a:schemeClr val="accent2"/>
+                </a:fillRef>
+                <a:effectRef idx="1">
+                  <a:schemeClr val="accent2"/>
+                </a:effectRef>
+                <a:fontRef idx="minor">
+                  <a:schemeClr val="dk1"/>
+                </a:fontRef>
+              </p:style>
+              <p:txBody>
+                <a:bodyPr rtlCol="0" anchor="ctr"/>
+                <a:lstStyle/>
+                <a:p>
+                  <a:pPr algn="ctr"/>
+                  <a:r>
+                    <a:rPr lang="fr-FR" dirty="0" err="1" smtClean="0"/>
+                    <a:t>onOk</a:t>
+                  </a:r>
+                  <a:endParaRPr lang="fr-FR" dirty="0"/>
+                </a:p>
+              </p:txBody>
+            </p:sp>
+            <p:sp>
+              <p:nvSpPr>
+                <p:cNvPr id="28" name="ZoneTexte 27"/>
                 <p:cNvSpPr txBox="1"/>
                 <p:nvPr/>
               </p:nvSpPr>
               <p:spPr>
                 <a:xfrm>
-                  <a:off x="948366" y="1292224"/>
-                  <a:ext cx="1674646" cy="369332"/>
+                  <a:off x="1795057" y="1470153"/>
+                  <a:ext cx="835545" cy="369332"/>
                 </a:xfrm>
                 <a:prstGeom prst="rect">
                   <a:avLst/>
@@ -5670,10 +5471,9 @@
                 </a:bodyPr>
                 <a:lstStyle/>
                 <a:p>
-                  <a:pPr algn="ctr"/>
                   <a:r>
-                    <a:rPr lang="fr-FR" dirty="0" smtClean="0"/>
-                    <a:t>Log</a:t>
+                    <a:rPr lang="fr-FR" dirty="0" err="1" smtClean="0"/>
+                    <a:t>Root</a:t>
                   </a:r>
                   <a:endParaRPr lang="fr-FR" dirty="0"/>
                 </a:p>
@@ -5682,14 +5482,56 @@
           </p:grpSp>
           <p:sp>
             <p:nvSpPr>
-              <p:cNvPr id="104" name="Rectangle à coins arrondis 103"/>
+              <p:cNvPr id="41" name="Rectangle à coins arrondis 40"/>
               <p:cNvSpPr/>
               <p:nvPr/>
             </p:nvSpPr>
             <p:spPr>
               <a:xfrm>
-                <a:off x="3683449" y="3910012"/>
-                <a:ext cx="190500" cy="200025"/>
+                <a:off x="2876808" y="1901527"/>
+                <a:ext cx="933204" cy="456252"/>
+              </a:xfrm>
+              <a:prstGeom prst="roundRect">
+                <a:avLst/>
+              </a:prstGeom>
+            </p:spPr>
+            <p:style>
+              <a:lnRef idx="1">
+                <a:schemeClr val="accent2"/>
+              </a:lnRef>
+              <a:fillRef idx="2">
+                <a:schemeClr val="accent2"/>
+              </a:fillRef>
+              <a:effectRef idx="1">
+                <a:schemeClr val="accent2"/>
+              </a:effectRef>
+              <a:fontRef idx="minor">
+                <a:schemeClr val="dk1"/>
+              </a:fontRef>
+            </p:style>
+            <p:txBody>
+              <a:bodyPr rtlCol="0" anchor="ctr"/>
+              <a:lstStyle/>
+              <a:p>
+                <a:pPr algn="ctr"/>
+                <a:r>
+                  <a:rPr lang="fr-FR" dirty="0" err="1" smtClean="0"/>
+                  <a:t>init</a:t>
+                </a:r>
+                <a:endParaRPr lang="fr-FR" dirty="0"/>
+              </a:p>
+            </p:txBody>
+          </p:sp>
+          <p:sp>
+            <p:nvSpPr>
+              <p:cNvPr id="42" name="Rectangle à coins arrondis 41"/>
+              <p:cNvSpPr/>
+              <p:nvPr/>
+            </p:nvSpPr>
+            <p:spPr>
+              <a:xfrm>
+                <a:off x="625240" y="1408112"/>
+                <a:ext cx="517269" cy="493415"/>
               </a:xfrm>
               <a:prstGeom prst="roundRect">
                 <a:avLst/>
@@ -5721,28 +5563,28 @@
         </p:grpSp>
         <p:sp>
           <p:nvSpPr>
-            <p:cNvPr id="101" name="Rectangle à coins arrondis 100"/>
+            <p:cNvPr id="19" name="Ellipse 18"/>
             <p:cNvSpPr/>
             <p:nvPr/>
           </p:nvSpPr>
           <p:spPr>
             <a:xfrm>
-              <a:off x="4832925" y="4227836"/>
-              <a:ext cx="190500" cy="200025"/>
+              <a:off x="2665501" y="681351"/>
+              <a:ext cx="343150" cy="344570"/>
             </a:xfrm>
-            <a:prstGeom prst="roundRect">
+            <a:prstGeom prst="ellipse">
               <a:avLst/>
             </a:prstGeom>
           </p:spPr>
           <p:style>
             <a:lnRef idx="1">
-              <a:schemeClr val="accent1"/>
+              <a:schemeClr val="accent6"/>
             </a:lnRef>
             <a:fillRef idx="2">
-              <a:schemeClr val="accent1"/>
+              <a:schemeClr val="accent6"/>
             </a:fillRef>
             <a:effectRef idx="1">
-              <a:schemeClr val="accent1"/>
+              <a:schemeClr val="accent6"/>
             </a:effectRef>
             <a:fontRef idx="minor">
               <a:schemeClr val="dk1"/>
@@ -5754,265 +5596,671 @@
             <a:p>
               <a:pPr algn="ctr"/>
               <a:r>
-                <a:rPr lang="fr-FR" dirty="0" smtClean="0"/>
+                <a:rPr lang="fr-FR" sz="1400" dirty="0"/>
                 <a:t>R</a:t>
               </a:r>
-              <a:endParaRPr lang="fr-FR" dirty="0"/>
             </a:p>
           </p:txBody>
         </p:sp>
       </p:grpSp>
       <p:sp>
         <p:nvSpPr>
-          <p:cNvPr id="2" name="ZoneTexte 1"/>
-          <p:cNvSpPr txBox="1"/>
+          <p:cNvPr id="84" name="Ellipse 83"/>
+          <p:cNvSpPr/>
           <p:nvPr/>
         </p:nvSpPr>
         <p:spPr>
           <a:xfrm>
-            <a:off x="6534513" y="2550401"/>
-            <a:ext cx="545342" cy="246221"/>
+            <a:off x="4419442" y="746390"/>
+            <a:ext cx="343150" cy="344570"/>
           </a:xfrm>
-          <a:prstGeom prst="rect">
+          <a:prstGeom prst="ellipse">
             <a:avLst/>
           </a:prstGeom>
-          <a:noFill/>
         </p:spPr>
+        <p:style>
+          <a:lnRef idx="1">
+            <a:schemeClr val="accent6"/>
+          </a:lnRef>
+          <a:fillRef idx="2">
+            <a:schemeClr val="accent6"/>
+          </a:fillRef>
+          <a:effectRef idx="1">
+            <a:schemeClr val="accent6"/>
+          </a:effectRef>
+          <a:fontRef idx="minor">
+            <a:schemeClr val="dk1"/>
+          </a:fontRef>
+        </p:style>
         <p:txBody>
-          <a:bodyPr wrap="none" rtlCol="0">
-            <a:spAutoFit/>
-          </a:bodyPr>
+          <a:bodyPr rtlCol="0" anchor="ctr"/>
           <a:lstStyle/>
           <a:p>
+            <a:pPr algn="ctr"/>
             <a:r>
-              <a:rPr lang="fr-FR" sz="1000" dirty="0" err="1" smtClean="0"/>
-              <a:t>getCnx</a:t>
+              <a:rPr lang="fr-FR" sz="1400" dirty="0" smtClean="0"/>
+              <a:t>C</a:t>
             </a:r>
-            <a:endParaRPr lang="fr-FR" sz="1000" dirty="0"/>
+            <a:endParaRPr lang="fr-FR" sz="1400" dirty="0"/>
           </a:p>
         </p:txBody>
       </p:sp>
       <p:sp>
         <p:nvSpPr>
-          <p:cNvPr id="62" name="ZoneTexte 61"/>
-          <p:cNvSpPr txBox="1"/>
+          <p:cNvPr id="85" name="Ellipse 84"/>
+          <p:cNvSpPr/>
           <p:nvPr/>
         </p:nvSpPr>
         <p:spPr>
           <a:xfrm>
-            <a:off x="4375907" y="4620980"/>
-            <a:ext cx="545342" cy="246221"/>
+            <a:off x="6853217" y="3227176"/>
+            <a:ext cx="343150" cy="344570"/>
           </a:xfrm>
-          <a:prstGeom prst="rect">
+          <a:prstGeom prst="ellipse">
             <a:avLst/>
-          </a:prstGeom>
-          <a:noFill/>
-        </p:spPr>
-        <p:txBody>
-          <a:bodyPr wrap="none" rtlCol="0">
-            <a:spAutoFit/>
-          </a:bodyPr>
-          <a:lstStyle/>
-          <a:p>
-            <a:r>
-              <a:rPr lang="fr-FR" sz="1000" dirty="0" err="1" smtClean="0"/>
-              <a:t>getCnx</a:t>
-            </a:r>
-            <a:endParaRPr lang="fr-FR" sz="1000" dirty="0"/>
-          </a:p>
-        </p:txBody>
-      </p:sp>
-      <p:sp>
-        <p:nvSpPr>
-          <p:cNvPr id="68" name="ZoneTexte 67"/>
-          <p:cNvSpPr txBox="1"/>
-          <p:nvPr/>
-        </p:nvSpPr>
-        <p:spPr>
-          <a:xfrm>
-            <a:off x="7036162" y="4243352"/>
-            <a:ext cx="580608" cy="246221"/>
-          </a:xfrm>
-          <a:prstGeom prst="rect">
-            <a:avLst/>
-          </a:prstGeom>
-          <a:noFill/>
-        </p:spPr>
-        <p:txBody>
-          <a:bodyPr wrap="none" rtlCol="0">
-            <a:spAutoFit/>
-          </a:bodyPr>
-          <a:lstStyle/>
-          <a:p>
-            <a:r>
-              <a:rPr lang="fr-FR" sz="1000" dirty="0" err="1" smtClean="0"/>
-              <a:t>getRow</a:t>
-            </a:r>
-            <a:endParaRPr lang="fr-FR" sz="1000" dirty="0"/>
-          </a:p>
-        </p:txBody>
-      </p:sp>
-      <p:sp>
-        <p:nvSpPr>
-          <p:cNvPr id="77" name="ZoneTexte 76"/>
-          <p:cNvSpPr txBox="1"/>
-          <p:nvPr/>
-        </p:nvSpPr>
-        <p:spPr>
-          <a:xfrm>
-            <a:off x="4381775" y="5712148"/>
-            <a:ext cx="580608" cy="246221"/>
-          </a:xfrm>
-          <a:prstGeom prst="rect">
-            <a:avLst/>
-          </a:prstGeom>
-          <a:noFill/>
-        </p:spPr>
-        <p:txBody>
-          <a:bodyPr wrap="none" rtlCol="0">
-            <a:spAutoFit/>
-          </a:bodyPr>
-          <a:lstStyle/>
-          <a:p>
-            <a:r>
-              <a:rPr lang="fr-FR" sz="1000" dirty="0" err="1" smtClean="0"/>
-              <a:t>getRow</a:t>
-            </a:r>
-            <a:endParaRPr lang="fr-FR" sz="1000" dirty="0"/>
-          </a:p>
-        </p:txBody>
-      </p:sp>
-      <p:sp>
-        <p:nvSpPr>
-          <p:cNvPr id="79" name="Pentagone 78"/>
-          <p:cNvSpPr/>
-          <p:nvPr/>
-        </p:nvSpPr>
-        <p:spPr>
-          <a:xfrm rot="5400000">
-            <a:off x="4514667" y="2270136"/>
-            <a:ext cx="219737" cy="238427"/>
-          </a:xfrm>
-          <a:prstGeom prst="homePlate">
-            <a:avLst>
-              <a:gd name="adj" fmla="val 49048"/>
-            </a:avLst>
           </a:prstGeom>
         </p:spPr>
         <p:style>
           <a:lnRef idx="1">
+            <a:schemeClr val="accent6"/>
+          </a:lnRef>
+          <a:fillRef idx="2">
+            <a:schemeClr val="accent6"/>
+          </a:fillRef>
+          <a:effectRef idx="1">
+            <a:schemeClr val="accent6"/>
+          </a:effectRef>
+          <a:fontRef idx="minor">
+            <a:schemeClr val="dk1"/>
+          </a:fontRef>
+        </p:style>
+        <p:txBody>
+          <a:bodyPr rtlCol="0" anchor="ctr"/>
+          <a:lstStyle/>
+          <a:p>
+            <a:pPr algn="ctr"/>
+            <a:r>
+              <a:rPr lang="fr-FR" sz="1400" dirty="0"/>
+              <a:t>Q</a:t>
+            </a:r>
+          </a:p>
+        </p:txBody>
+      </p:sp>
+      <p:grpSp>
+        <p:nvGrpSpPr>
+          <p:cNvPr id="21" name="Groupe 20"/>
+          <p:cNvGrpSpPr/>
+          <p:nvPr/>
+        </p:nvGrpSpPr>
+        <p:grpSpPr>
+          <a:xfrm>
+            <a:off x="3873570" y="5068823"/>
+            <a:ext cx="3672181" cy="1327428"/>
+            <a:chOff x="2631087" y="5242650"/>
+            <a:chExt cx="3672181" cy="1327428"/>
+          </a:xfrm>
+        </p:grpSpPr>
+        <p:grpSp>
+          <p:nvGrpSpPr>
+            <p:cNvPr id="99" name="Groupe 98"/>
+            <p:cNvGrpSpPr/>
+            <p:nvPr/>
+          </p:nvGrpSpPr>
+          <p:grpSpPr>
+            <a:xfrm>
+              <a:off x="3192488" y="5242650"/>
+              <a:ext cx="3110780" cy="1327428"/>
+              <a:chOff x="4832925" y="4083374"/>
+              <a:chExt cx="2056880" cy="768350"/>
+            </a:xfrm>
+          </p:grpSpPr>
+          <p:grpSp>
+            <p:nvGrpSpPr>
+              <p:cNvPr id="100" name="Groupe 99"/>
+              <p:cNvGrpSpPr/>
+              <p:nvPr/>
+            </p:nvGrpSpPr>
+            <p:grpSpPr>
+              <a:xfrm>
+                <a:off x="4845625" y="4083374"/>
+                <a:ext cx="2044180" cy="768350"/>
+                <a:chOff x="3683449" y="3473450"/>
+                <a:chExt cx="2044180" cy="768350"/>
+              </a:xfrm>
+            </p:grpSpPr>
+            <p:grpSp>
+              <p:nvGrpSpPr>
+                <p:cNvPr id="102" name="Groupe 101"/>
+                <p:cNvGrpSpPr/>
+                <p:nvPr/>
+              </p:nvGrpSpPr>
+              <p:grpSpPr>
+                <a:xfrm>
+                  <a:off x="3778699" y="3473450"/>
+                  <a:ext cx="1948930" cy="768350"/>
+                  <a:chOff x="806899" y="1123950"/>
+                  <a:chExt cx="1948930" cy="768350"/>
+                </a:xfrm>
+              </p:grpSpPr>
+              <p:grpSp>
+                <p:nvGrpSpPr>
+                  <p:cNvPr id="105" name="Groupe 104"/>
+                  <p:cNvGrpSpPr/>
+                  <p:nvPr/>
+                </p:nvGrpSpPr>
+                <p:grpSpPr>
+                  <a:xfrm>
+                    <a:off x="806899" y="1123950"/>
+                    <a:ext cx="1948930" cy="768350"/>
+                    <a:chOff x="688962" y="583534"/>
+                    <a:chExt cx="1948930" cy="2032666"/>
+                  </a:xfrm>
+                </p:grpSpPr>
+                <p:sp>
+                  <p:nvSpPr>
+                    <p:cNvPr id="107" name="Rectangle à coins arrondis 106"/>
+                    <p:cNvSpPr/>
+                    <p:nvPr/>
+                  </p:nvSpPr>
+                  <p:spPr>
+                    <a:xfrm>
+                      <a:off x="1317018" y="2463800"/>
+                      <a:ext cx="146657" cy="95250"/>
+                    </a:xfrm>
+                    <a:prstGeom prst="roundRect">
+                      <a:avLst/>
+                    </a:prstGeom>
+                  </p:spPr>
+                  <p:style>
+                    <a:lnRef idx="2">
+                      <a:schemeClr val="accent1">
+                        <a:shade val="50000"/>
+                      </a:schemeClr>
+                    </a:lnRef>
+                    <a:fillRef idx="1">
+                      <a:schemeClr val="accent1"/>
+                    </a:fillRef>
+                    <a:effectRef idx="0">
+                      <a:schemeClr val="accent1"/>
+                    </a:effectRef>
+                    <a:fontRef idx="minor">
+                      <a:schemeClr val="lt1"/>
+                    </a:fontRef>
+                  </p:style>
+                  <p:txBody>
+                    <a:bodyPr rtlCol="0" anchor="ctr"/>
+                    <a:lstStyle/>
+                    <a:p>
+                      <a:pPr algn="ctr"/>
+                      <a:endParaRPr lang="fr-FR"/>
+                    </a:p>
+                  </p:txBody>
+                </p:sp>
+                <p:sp>
+                  <p:nvSpPr>
+                    <p:cNvPr id="108" name="Rectangle à coins arrondis 107"/>
+                    <p:cNvSpPr/>
+                    <p:nvPr/>
+                  </p:nvSpPr>
+                  <p:spPr>
+                    <a:xfrm>
+                      <a:off x="1566434" y="2463800"/>
+                      <a:ext cx="146657" cy="95250"/>
+                    </a:xfrm>
+                    <a:prstGeom prst="roundRect">
+                      <a:avLst/>
+                    </a:prstGeom>
+                  </p:spPr>
+                  <p:style>
+                    <a:lnRef idx="2">
+                      <a:schemeClr val="accent1">
+                        <a:shade val="50000"/>
+                      </a:schemeClr>
+                    </a:lnRef>
+                    <a:fillRef idx="1">
+                      <a:schemeClr val="accent1"/>
+                    </a:fillRef>
+                    <a:effectRef idx="0">
+                      <a:schemeClr val="accent1"/>
+                    </a:effectRef>
+                    <a:fontRef idx="minor">
+                      <a:schemeClr val="lt1"/>
+                    </a:fontRef>
+                  </p:style>
+                  <p:txBody>
+                    <a:bodyPr rtlCol="0" anchor="ctr"/>
+                    <a:lstStyle/>
+                    <a:p>
+                      <a:pPr algn="ctr"/>
+                      <a:endParaRPr lang="fr-FR"/>
+                    </a:p>
+                  </p:txBody>
+                </p:sp>
+                <p:sp>
+                  <p:nvSpPr>
+                    <p:cNvPr id="109" name="Rectangle à coins arrondis 108"/>
+                    <p:cNvSpPr/>
+                    <p:nvPr/>
+                  </p:nvSpPr>
+                  <p:spPr>
+                    <a:xfrm>
+                      <a:off x="1825072" y="2463800"/>
+                      <a:ext cx="146657" cy="95250"/>
+                    </a:xfrm>
+                    <a:prstGeom prst="roundRect">
+                      <a:avLst/>
+                    </a:prstGeom>
+                  </p:spPr>
+                  <p:style>
+                    <a:lnRef idx="2">
+                      <a:schemeClr val="accent1">
+                        <a:shade val="50000"/>
+                      </a:schemeClr>
+                    </a:lnRef>
+                    <a:fillRef idx="1">
+                      <a:schemeClr val="accent1"/>
+                    </a:fillRef>
+                    <a:effectRef idx="0">
+                      <a:schemeClr val="accent1"/>
+                    </a:effectRef>
+                    <a:fontRef idx="minor">
+                      <a:schemeClr val="lt1"/>
+                    </a:fontRef>
+                  </p:style>
+                  <p:txBody>
+                    <a:bodyPr rtlCol="0" anchor="ctr"/>
+                    <a:lstStyle/>
+                    <a:p>
+                      <a:pPr algn="ctr"/>
+                      <a:endParaRPr lang="fr-FR"/>
+                    </a:p>
+                  </p:txBody>
+                </p:sp>
+                <p:sp>
+                  <p:nvSpPr>
+                    <p:cNvPr id="110" name="Rectangle à coins arrondis 109"/>
+                    <p:cNvSpPr/>
+                    <p:nvPr/>
+                  </p:nvSpPr>
+                  <p:spPr>
+                    <a:xfrm>
+                      <a:off x="2094893" y="2463800"/>
+                      <a:ext cx="146657" cy="95250"/>
+                    </a:xfrm>
+                    <a:prstGeom prst="roundRect">
+                      <a:avLst/>
+                    </a:prstGeom>
+                  </p:spPr>
+                  <p:style>
+                    <a:lnRef idx="2">
+                      <a:schemeClr val="accent1">
+                        <a:shade val="50000"/>
+                      </a:schemeClr>
+                    </a:lnRef>
+                    <a:fillRef idx="1">
+                      <a:schemeClr val="accent1"/>
+                    </a:fillRef>
+                    <a:effectRef idx="0">
+                      <a:schemeClr val="accent1"/>
+                    </a:effectRef>
+                    <a:fontRef idx="minor">
+                      <a:schemeClr val="lt1"/>
+                    </a:fontRef>
+                  </p:style>
+                  <p:txBody>
+                    <a:bodyPr rtlCol="0" anchor="ctr"/>
+                    <a:lstStyle/>
+                    <a:p>
+                      <a:pPr algn="ctr"/>
+                      <a:endParaRPr lang="fr-FR"/>
+                    </a:p>
+                  </p:txBody>
+                </p:sp>
+                <p:sp>
+                  <p:nvSpPr>
+                    <p:cNvPr id="111" name="Rectangle à coins arrondis 110"/>
+                    <p:cNvSpPr/>
+                    <p:nvPr/>
+                  </p:nvSpPr>
+                  <p:spPr>
+                    <a:xfrm>
+                      <a:off x="1066193" y="2463800"/>
+                      <a:ext cx="146657" cy="95250"/>
+                    </a:xfrm>
+                    <a:prstGeom prst="roundRect">
+                      <a:avLst/>
+                    </a:prstGeom>
+                  </p:spPr>
+                  <p:style>
+                    <a:lnRef idx="2">
+                      <a:schemeClr val="accent1">
+                        <a:shade val="50000"/>
+                      </a:schemeClr>
+                    </a:lnRef>
+                    <a:fillRef idx="1">
+                      <a:schemeClr val="accent1"/>
+                    </a:fillRef>
+                    <a:effectRef idx="0">
+                      <a:schemeClr val="accent1"/>
+                    </a:effectRef>
+                    <a:fontRef idx="minor">
+                      <a:schemeClr val="lt1"/>
+                    </a:fontRef>
+                  </p:style>
+                  <p:txBody>
+                    <a:bodyPr rtlCol="0" anchor="ctr"/>
+                    <a:lstStyle/>
+                    <a:p>
+                      <a:pPr algn="ctr"/>
+                      <a:endParaRPr lang="fr-FR"/>
+                    </a:p>
+                  </p:txBody>
+                </p:sp>
+                <p:sp>
+                  <p:nvSpPr>
+                    <p:cNvPr id="112" name="Rectangle à coins arrondis 111"/>
+                    <p:cNvSpPr/>
+                    <p:nvPr/>
+                  </p:nvSpPr>
+                  <p:spPr>
+                    <a:xfrm>
+                      <a:off x="2358418" y="2463800"/>
+                      <a:ext cx="146657" cy="95250"/>
+                    </a:xfrm>
+                    <a:prstGeom prst="roundRect">
+                      <a:avLst/>
+                    </a:prstGeom>
+                  </p:spPr>
+                  <p:style>
+                    <a:lnRef idx="2">
+                      <a:schemeClr val="accent1">
+                        <a:shade val="50000"/>
+                      </a:schemeClr>
+                    </a:lnRef>
+                    <a:fillRef idx="1">
+                      <a:schemeClr val="accent1"/>
+                    </a:fillRef>
+                    <a:effectRef idx="0">
+                      <a:schemeClr val="accent1"/>
+                    </a:effectRef>
+                    <a:fontRef idx="minor">
+                      <a:schemeClr val="lt1"/>
+                    </a:fontRef>
+                  </p:style>
+                  <p:txBody>
+                    <a:bodyPr rtlCol="0" anchor="ctr"/>
+                    <a:lstStyle/>
+                    <a:p>
+                      <a:pPr algn="ctr"/>
+                      <a:endParaRPr lang="fr-FR"/>
+                    </a:p>
+                  </p:txBody>
+                </p:sp>
+                <p:sp>
+                  <p:nvSpPr>
+                    <p:cNvPr id="113" name="Rectangle à coins arrondis 112"/>
+                    <p:cNvSpPr/>
+                    <p:nvPr/>
+                  </p:nvSpPr>
+                  <p:spPr>
+                    <a:xfrm>
+                      <a:off x="688962" y="583534"/>
+                      <a:ext cx="1948930" cy="2032666"/>
+                    </a:xfrm>
+                    <a:prstGeom prst="roundRect">
+                      <a:avLst>
+                        <a:gd name="adj" fmla="val 1827"/>
+                      </a:avLst>
+                    </a:prstGeom>
+                  </p:spPr>
+                  <p:style>
+                    <a:lnRef idx="1">
+                      <a:schemeClr val="accent3"/>
+                    </a:lnRef>
+                    <a:fillRef idx="2">
+                      <a:schemeClr val="accent3"/>
+                    </a:fillRef>
+                    <a:effectRef idx="1">
+                      <a:schemeClr val="accent3"/>
+                    </a:effectRef>
+                    <a:fontRef idx="minor">
+                      <a:schemeClr val="dk1"/>
+                    </a:fontRef>
+                  </p:style>
+                  <p:txBody>
+                    <a:bodyPr rtlCol="0" anchor="ctr"/>
+                    <a:lstStyle/>
+                    <a:p>
+                      <a:pPr algn="ctr"/>
+                      <a:endParaRPr lang="fr-FR" dirty="0"/>
+                    </a:p>
+                  </p:txBody>
+                </p:sp>
+              </p:grpSp>
+              <p:sp>
+                <p:nvSpPr>
+                  <p:cNvPr id="106" name="ZoneTexte 105"/>
+                  <p:cNvSpPr txBox="1"/>
+                  <p:nvPr/>
+                </p:nvSpPr>
+                <p:spPr>
+                  <a:xfrm>
+                    <a:off x="935578" y="1368425"/>
+                    <a:ext cx="1674646" cy="369332"/>
+                  </a:xfrm>
+                  <a:prstGeom prst="rect">
+                    <a:avLst/>
+                  </a:prstGeom>
+                  <a:noFill/>
+                </p:spPr>
+                <p:txBody>
+                  <a:bodyPr wrap="square" rtlCol="0">
+                    <a:spAutoFit/>
+                  </a:bodyPr>
+                  <a:lstStyle/>
+                  <a:p>
+                    <a:pPr algn="ctr"/>
+                    <a:r>
+                      <a:rPr lang="fr-FR" dirty="0" smtClean="0"/>
+                      <a:t>Log</a:t>
+                    </a:r>
+                    <a:endParaRPr lang="fr-FR" dirty="0"/>
+                  </a:p>
+                </p:txBody>
+              </p:sp>
+            </p:grpSp>
+            <p:sp>
+              <p:nvSpPr>
+                <p:cNvPr id="104" name="Rectangle à coins arrondis 103"/>
+                <p:cNvSpPr/>
+                <p:nvPr/>
+              </p:nvSpPr>
+              <p:spPr>
+                <a:xfrm>
+                  <a:off x="3683449" y="3910012"/>
+                  <a:ext cx="190500" cy="200025"/>
+                </a:xfrm>
+                <a:prstGeom prst="roundRect">
+                  <a:avLst/>
+                </a:prstGeom>
+              </p:spPr>
+              <p:style>
+                <a:lnRef idx="1">
+                  <a:schemeClr val="accent1"/>
+                </a:lnRef>
+                <a:fillRef idx="2">
+                  <a:schemeClr val="accent1"/>
+                </a:fillRef>
+                <a:effectRef idx="1">
+                  <a:schemeClr val="accent1"/>
+                </a:effectRef>
+                <a:fontRef idx="minor">
+                  <a:schemeClr val="dk1"/>
+                </a:fontRef>
+              </p:style>
+              <p:txBody>
+                <a:bodyPr rtlCol="0" anchor="ctr"/>
+                <a:lstStyle/>
+                <a:p>
+                  <a:pPr algn="ctr"/>
+                  <a:endParaRPr lang="fr-FR"/>
+                </a:p>
+              </p:txBody>
+            </p:sp>
+          </p:grpSp>
+          <p:sp>
+            <p:nvSpPr>
+              <p:cNvPr id="101" name="Rectangle à coins arrondis 100"/>
+              <p:cNvSpPr/>
+              <p:nvPr/>
+            </p:nvSpPr>
+            <p:spPr>
+              <a:xfrm>
+                <a:off x="4832925" y="4227836"/>
+                <a:ext cx="190500" cy="200025"/>
+              </a:xfrm>
+              <a:prstGeom prst="roundRect">
+                <a:avLst/>
+              </a:prstGeom>
+            </p:spPr>
+            <p:style>
+              <a:lnRef idx="1">
+                <a:schemeClr val="accent1"/>
+              </a:lnRef>
+              <a:fillRef idx="2">
+                <a:schemeClr val="accent1"/>
+              </a:fillRef>
+              <a:effectRef idx="1">
+                <a:schemeClr val="accent1"/>
+              </a:effectRef>
+              <a:fontRef idx="minor">
+                <a:schemeClr val="dk1"/>
+              </a:fontRef>
+            </p:style>
+            <p:txBody>
+              <a:bodyPr rtlCol="0" anchor="ctr"/>
+              <a:lstStyle/>
+              <a:p>
+                <a:pPr algn="ctr"/>
+                <a:r>
+                  <a:rPr lang="fr-FR" dirty="0" smtClean="0"/>
+                  <a:t>R</a:t>
+                </a:r>
+                <a:endParaRPr lang="fr-FR" dirty="0"/>
+              </a:p>
+            </p:txBody>
+          </p:sp>
+        </p:grpSp>
+        <p:sp>
+          <p:nvSpPr>
+            <p:cNvPr id="77" name="ZoneTexte 76"/>
+            <p:cNvSpPr txBox="1"/>
+            <p:nvPr/>
+          </p:nvSpPr>
+          <p:spPr>
+            <a:xfrm>
+              <a:off x="2631087" y="5665013"/>
+              <a:ext cx="580608" cy="246221"/>
+            </a:xfrm>
+            <a:prstGeom prst="rect">
+              <a:avLst/>
+            </a:prstGeom>
+            <a:noFill/>
+          </p:spPr>
+          <p:txBody>
+            <a:bodyPr wrap="none" rtlCol="0">
+              <a:spAutoFit/>
+            </a:bodyPr>
+            <a:lstStyle/>
+            <a:p>
+              <a:r>
+                <a:rPr lang="fr-FR" sz="1000" dirty="0" err="1" smtClean="0"/>
+                <a:t>getRow</a:t>
+              </a:r>
+              <a:endParaRPr lang="fr-FR" sz="1000" dirty="0"/>
+            </a:p>
+          </p:txBody>
+        </p:sp>
+        <p:sp>
+          <p:nvSpPr>
+            <p:cNvPr id="86" name="Ellipse 85"/>
+            <p:cNvSpPr/>
+            <p:nvPr/>
+          </p:nvSpPr>
+          <p:spPr>
+            <a:xfrm>
+              <a:off x="5836936" y="5316519"/>
+              <a:ext cx="343150" cy="344570"/>
+            </a:xfrm>
+            <a:prstGeom prst="ellipse">
+              <a:avLst/>
+            </a:prstGeom>
+          </p:spPr>
+          <p:style>
+            <a:lnRef idx="1">
+              <a:schemeClr val="accent6"/>
+            </a:lnRef>
+            <a:fillRef idx="2">
+              <a:schemeClr val="accent6"/>
+            </a:fillRef>
+            <a:effectRef idx="1">
+              <a:schemeClr val="accent6"/>
+            </a:effectRef>
+            <a:fontRef idx="minor">
+              <a:schemeClr val="dk1"/>
+            </a:fontRef>
+          </p:style>
+          <p:txBody>
+            <a:bodyPr rtlCol="0" anchor="ctr"/>
+            <a:lstStyle/>
+            <a:p>
+              <a:pPr algn="ctr"/>
+              <a:r>
+                <a:rPr lang="fr-FR" sz="1400" dirty="0"/>
+                <a:t>L</a:t>
+              </a:r>
+            </a:p>
+          </p:txBody>
+        </p:sp>
+      </p:grpSp>
+      <p:cxnSp>
+        <p:nvCxnSpPr>
+          <p:cNvPr id="31" name="Connecteur droit 30"/>
+          <p:cNvCxnSpPr/>
+          <p:nvPr/>
+        </p:nvCxnSpPr>
+        <p:spPr>
+          <a:xfrm>
+            <a:off x="148402" y="4925961"/>
+            <a:ext cx="8995598" cy="0"/>
+          </a:xfrm>
+          <a:prstGeom prst="line">
+            <a:avLst/>
+          </a:prstGeom>
+          <a:ln>
+            <a:solidFill>
+              <a:schemeClr val="bg1">
+                <a:lumMod val="65000"/>
+              </a:schemeClr>
+            </a:solidFill>
+            <a:prstDash val="dash"/>
+          </a:ln>
+        </p:spPr>
+        <p:style>
+          <a:lnRef idx="2">
             <a:schemeClr val="dk1"/>
           </a:lnRef>
-          <a:fillRef idx="2">
+          <a:fillRef idx="0">
             <a:schemeClr val="dk1"/>
           </a:fillRef>
           <a:effectRef idx="1">
             <a:schemeClr val="dk1"/>
           </a:effectRef>
           <a:fontRef idx="minor">
-            <a:schemeClr val="dk1"/>
+            <a:schemeClr val="tx1"/>
           </a:fontRef>
         </p:style>
-        <p:txBody>
-          <a:bodyPr vert="vert270" rtlCol="0" anchor="ctr"/>
-          <a:lstStyle/>
-          <a:p>
-            <a:pPr algn="ctr"/>
-            <a:r>
-              <a:rPr lang="fr-FR" dirty="0" smtClean="0"/>
-              <a:t>u</a:t>
-            </a:r>
-            <a:endParaRPr lang="fr-FR" dirty="0"/>
-          </a:p>
-        </p:txBody>
-      </p:sp>
-      <p:sp>
-        <p:nvSpPr>
-          <p:cNvPr id="81" name="Pentagone 80"/>
-          <p:cNvSpPr/>
-          <p:nvPr/>
-        </p:nvSpPr>
-        <p:spPr>
-          <a:xfrm rot="5400000">
-            <a:off x="4818306" y="2271885"/>
-            <a:ext cx="219737" cy="238427"/>
-          </a:xfrm>
-          <a:prstGeom prst="homePlate">
-            <a:avLst>
-              <a:gd name="adj" fmla="val 49048"/>
-            </a:avLst>
-          </a:prstGeom>
-        </p:spPr>
-        <p:style>
-          <a:lnRef idx="1">
-            <a:schemeClr val="dk1"/>
-          </a:lnRef>
-          <a:fillRef idx="2">
-            <a:schemeClr val="dk1"/>
-          </a:fillRef>
-          <a:effectRef idx="1">
-            <a:schemeClr val="dk1"/>
-          </a:effectRef>
-          <a:fontRef idx="minor">
-            <a:schemeClr val="dk1"/>
-          </a:fontRef>
-        </p:style>
-        <p:txBody>
-          <a:bodyPr vert="vert270" rtlCol="0" anchor="ctr"/>
-          <a:lstStyle/>
-          <a:p>
-            <a:pPr algn="ctr"/>
-            <a:r>
-              <a:rPr lang="fr-FR" dirty="0"/>
-              <a:t>p</a:t>
-            </a:r>
-            <a:endParaRPr lang="fr-FR" dirty="0"/>
-          </a:p>
-        </p:txBody>
-      </p:sp>
-      <p:sp>
-        <p:nvSpPr>
-          <p:cNvPr id="83" name="Pentagone 82"/>
-          <p:cNvSpPr/>
-          <p:nvPr/>
-        </p:nvSpPr>
-        <p:spPr>
-          <a:xfrm rot="5400000">
-            <a:off x="5125129" y="2269203"/>
-            <a:ext cx="219737" cy="238427"/>
-          </a:xfrm>
-          <a:prstGeom prst="homePlate">
-            <a:avLst>
-              <a:gd name="adj" fmla="val 49048"/>
-            </a:avLst>
-          </a:prstGeom>
-        </p:spPr>
-        <p:style>
-          <a:lnRef idx="1">
-            <a:schemeClr val="dk1"/>
-          </a:lnRef>
-          <a:fillRef idx="2">
-            <a:schemeClr val="dk1"/>
-          </a:fillRef>
-          <a:effectRef idx="1">
-            <a:schemeClr val="dk1"/>
-          </a:effectRef>
-          <a:fontRef idx="minor">
-            <a:schemeClr val="dk1"/>
-          </a:fontRef>
-        </p:style>
-        <p:txBody>
-          <a:bodyPr vert="vert270" rtlCol="0" anchor="ctr"/>
-          <a:lstStyle/>
-          <a:p>
-            <a:pPr algn="ctr"/>
-            <a:r>
-              <a:rPr lang="fr-FR" dirty="0"/>
-              <a:t>d</a:t>
-            </a:r>
-          </a:p>
-        </p:txBody>
-      </p:sp>
+      </p:cxnSp>
     </p:spTree>
     <p:extLst>
       <p:ext uri="{BB962C8B-B14F-4D97-AF65-F5344CB8AC3E}">
@@ -6520,7 +6768,7 @@
         </p:nvGrpSpPr>
         <p:grpSpPr>
           <a:xfrm>
-            <a:off x="4197943" y="2389350"/>
+            <a:off x="4945630" y="2761582"/>
             <a:ext cx="2152059" cy="768350"/>
             <a:chOff x="3683449" y="3473450"/>
             <a:chExt cx="2152059" cy="768350"/>
@@ -6956,7 +7204,7 @@
         <p:spPr>
           <a:xfrm>
             <a:off x="2863708" y="1646752"/>
-            <a:ext cx="1334235" cy="1126773"/>
+            <a:ext cx="2081922" cy="1499005"/>
           </a:xfrm>
           <a:prstGeom prst="bentConnector3">
             <a:avLst>
@@ -6993,14 +7241,14 @@
         </p:nvCxnSpPr>
         <p:spPr>
           <a:xfrm flipH="1">
-            <a:off x="4918934" y="2785152"/>
-            <a:ext cx="1431068" cy="3003197"/>
+            <a:off x="5176994" y="3157384"/>
+            <a:ext cx="1920695" cy="1654564"/>
           </a:xfrm>
           <a:prstGeom prst="bentConnector5">
             <a:avLst>
-              <a:gd name="adj1" fmla="val -15974"/>
+              <a:gd name="adj1" fmla="val -11902"/>
               <a:gd name="adj2" fmla="val 50000"/>
-              <a:gd name="adj3" fmla="val 115974"/>
+              <a:gd name="adj3" fmla="val 111902"/>
             </a:avLst>
           </a:prstGeom>
           <a:ln>
@@ -7030,7 +7278,7 @@
         </p:nvGrpSpPr>
         <p:grpSpPr>
           <a:xfrm>
-            <a:off x="4918934" y="5543874"/>
+            <a:off x="5176994" y="4567473"/>
             <a:ext cx="2056880" cy="768350"/>
             <a:chOff x="4832925" y="4083374"/>
             <a:chExt cx="2056880" cy="768350"/>
@@ -7477,7 +7725,7 @@
         </p:nvSpPr>
         <p:spPr>
           <a:xfrm rot="5400000">
-            <a:off x="4514667" y="2270136"/>
+            <a:off x="5262354" y="2642368"/>
             <a:ext cx="219737" cy="238427"/>
           </a:xfrm>
           <a:prstGeom prst="homePlate">
@@ -7521,7 +7769,7 @@
         </p:nvSpPr>
         <p:spPr>
           <a:xfrm>
-            <a:off x="4489994" y="2039067"/>
+            <a:off x="5237681" y="2411299"/>
             <a:ext cx="263214" cy="276999"/>
           </a:xfrm>
           <a:prstGeom prst="rect">
@@ -7547,6 +7795,80 @@
     <p:extLst>
       <p:ext uri="{BB962C8B-B14F-4D97-AF65-F5344CB8AC3E}">
         <p14:creationId xmlns:p14="http://schemas.microsoft.com/office/powerpoint/2010/main" val="1313497082"/>
+      </p:ext>
+    </p:extLst>
+  </p:cSld>
+  <p:clrMapOvr>
+    <a:masterClrMapping/>
+  </p:clrMapOvr>
+</p:sld>
+</file>
+
+<file path=ppt/slides/slide4.xml><?xml version="1.0" encoding="utf-8"?>
+<p:sld xmlns:a="http://schemas.openxmlformats.org/drawingml/2006/main" xmlns:r="http://schemas.openxmlformats.org/officeDocument/2006/relationships" xmlns:p="http://schemas.openxmlformats.org/presentationml/2006/main">
+  <p:cSld>
+    <p:spTree>
+      <p:nvGrpSpPr>
+        <p:cNvPr id="1" name=""/>
+        <p:cNvGrpSpPr/>
+        <p:nvPr/>
+      </p:nvGrpSpPr>
+      <p:grpSpPr>
+        <a:xfrm>
+          <a:off x="0" y="0"/>
+          <a:ext cx="0" cy="0"/>
+          <a:chOff x="0" y="0"/>
+          <a:chExt cx="0" cy="0"/>
+        </a:xfrm>
+      </p:grpSpPr>
+      <p:sp>
+        <p:nvSpPr>
+          <p:cNvPr id="4" name="ZoneTexte 3"/>
+          <p:cNvSpPr txBox="1"/>
+          <p:nvPr/>
+        </p:nvSpPr>
+        <p:spPr>
+          <a:xfrm>
+            <a:off x="280220" y="1209367"/>
+            <a:ext cx="7551174" cy="646331"/>
+          </a:xfrm>
+          <a:prstGeom prst="rect">
+            <a:avLst/>
+          </a:prstGeom>
+          <a:noFill/>
+        </p:spPr>
+        <p:txBody>
+          <a:bodyPr wrap="square" rtlCol="0">
+            <a:spAutoFit/>
+          </a:bodyPr>
+          <a:lstStyle/>
+          <a:p>
+            <a:r>
+              <a:rPr lang="fr-FR" dirty="0" smtClean="0"/>
+              <a:t>Call = Call(slot)</a:t>
+            </a:r>
+          </a:p>
+          <a:p>
+            <a:r>
+              <a:rPr lang="fr-FR" dirty="0" smtClean="0"/>
+              <a:t>C(S(‘</a:t>
+            </a:r>
+            <a:r>
+              <a:rPr lang="fr-FR" dirty="0" err="1" smtClean="0"/>
+              <a:t>getCnx</a:t>
+            </a:r>
+            <a:r>
+              <a:rPr lang="fr-FR" smtClean="0"/>
+              <a:t>’))</a:t>
+            </a:r>
+            <a:endParaRPr lang="fr-FR" dirty="0"/>
+          </a:p>
+        </p:txBody>
+      </p:sp>
+    </p:spTree>
+    <p:extLst>
+      <p:ext uri="{BB962C8B-B14F-4D97-AF65-F5344CB8AC3E}">
+        <p14:creationId xmlns:p14="http://schemas.microsoft.com/office/powerpoint/2010/main" val="1104666236"/>
       </p:ext>
     </p:extLst>
   </p:cSld>

</xml_diff>